<commit_message>
Correct and improve Pythagoras trees/Levy C curves
</commit_message>
<xml_diff>
--- a/docs/assets/fractals/curves/levy-c-345.pptx
+++ b/docs/assets/fractals/curves/levy-c-345.pptx
@@ -4,13 +4,10 @@
   <p:sldMasterIdLst>
     <p:sldMasterId id="2147483660" r:id="rId1"/>
   </p:sldMasterIdLst>
-  <p:notesMasterIdLst>
-    <p:notesMasterId r:id="rId3"/>
-  </p:notesMasterIdLst>
   <p:sldIdLst>
-    <p:sldId id="320" r:id="rId2"/>
+    <p:sldId id="256" r:id="rId2"/>
   </p:sldIdLst>
-  <p:sldSz cx="8640763" cy="7199313"/>
+  <p:sldSz cx="8640763" cy="6119813"/>
   <p:notesSz cx="6858000" cy="9144000"/>
   <p:defaultTextStyle>
     <a:defPPr>
@@ -107,448 +104,7 @@
       </a:defRPr>
     </a:lvl9pPr>
   </p:defaultTextStyle>
-  <p:extLst>
-    <p:ext uri="{EFAFB233-063F-42B5-8137-9DF3F51BA10A}">
-      <p15:sldGuideLst xmlns:p15="http://schemas.microsoft.com/office/powerpoint/2012/main"/>
-    </p:ext>
-  </p:extLst>
 </p:presentation>
-</file>
-
-<file path=ppt/notesMasters/notesMaster1.xml><?xml version="1.0" encoding="utf-8"?>
-<p:notesMaster xmlns:a="http://schemas.openxmlformats.org/drawingml/2006/main" xmlns:r="http://schemas.openxmlformats.org/officeDocument/2006/relationships" xmlns:p="http://schemas.openxmlformats.org/presentationml/2006/main">
-  <p:cSld>
-    <p:bg>
-      <p:bgRef idx="1001">
-        <a:schemeClr val="bg1"/>
-      </p:bgRef>
-    </p:bg>
-    <p:spTree>
-      <p:nvGrpSpPr>
-        <p:cNvPr id="1" name=""/>
-        <p:cNvGrpSpPr/>
-        <p:nvPr/>
-      </p:nvGrpSpPr>
-      <p:grpSpPr>
-        <a:xfrm>
-          <a:off x="0" y="0"/>
-          <a:ext cx="0" cy="0"/>
-          <a:chOff x="0" y="0"/>
-          <a:chExt cx="0" cy="0"/>
-        </a:xfrm>
-      </p:grpSpPr>
-      <p:sp>
-        <p:nvSpPr>
-          <p:cNvPr id="2" name="Header Placeholder 1"/>
-          <p:cNvSpPr>
-            <a:spLocks noGrp="1"/>
-          </p:cNvSpPr>
-          <p:nvPr>
-            <p:ph type="hdr" sz="quarter"/>
-          </p:nvPr>
-        </p:nvSpPr>
-        <p:spPr>
-          <a:xfrm>
-            <a:off x="0" y="0"/>
-            <a:ext cx="2971800" cy="458788"/>
-          </a:xfrm>
-          <a:prstGeom prst="rect">
-            <a:avLst/>
-          </a:prstGeom>
-        </p:spPr>
-        <p:txBody>
-          <a:bodyPr vert="horz" lIns="91440" tIns="45720" rIns="91440" bIns="45720" rtlCol="0"/>
-          <a:lstStyle>
-            <a:lvl1pPr algn="l">
-              <a:defRPr sz="1200"/>
-            </a:lvl1pPr>
-          </a:lstStyle>
-          <a:p>
-            <a:endParaRPr lang="en-GB"/>
-          </a:p>
-        </p:txBody>
-      </p:sp>
-      <p:sp>
-        <p:nvSpPr>
-          <p:cNvPr id="3" name="Date Placeholder 2"/>
-          <p:cNvSpPr>
-            <a:spLocks noGrp="1"/>
-          </p:cNvSpPr>
-          <p:nvPr>
-            <p:ph type="dt" idx="1"/>
-          </p:nvPr>
-        </p:nvSpPr>
-        <p:spPr>
-          <a:xfrm>
-            <a:off x="3884613" y="0"/>
-            <a:ext cx="2971800" cy="458788"/>
-          </a:xfrm>
-          <a:prstGeom prst="rect">
-            <a:avLst/>
-          </a:prstGeom>
-        </p:spPr>
-        <p:txBody>
-          <a:bodyPr vert="horz" lIns="91440" tIns="45720" rIns="91440" bIns="45720" rtlCol="0"/>
-          <a:lstStyle>
-            <a:lvl1pPr algn="r">
-              <a:defRPr sz="1200"/>
-            </a:lvl1pPr>
-          </a:lstStyle>
-          <a:p>
-            <a:fld id="{B3645E82-7B42-A74F-8BFC-0AA10BEB2623}" type="datetimeFigureOut">
-              <a:rPr lang="en-GB" smtClean="0"/>
-              <a:t>07/07/2024</a:t>
-            </a:fld>
-            <a:endParaRPr lang="en-GB"/>
-          </a:p>
-        </p:txBody>
-      </p:sp>
-      <p:sp>
-        <p:nvSpPr>
-          <p:cNvPr id="4" name="Slide Image Placeholder 3"/>
-          <p:cNvSpPr>
-            <a:spLocks noGrp="1" noRot="1" noChangeAspect="1"/>
-          </p:cNvSpPr>
-          <p:nvPr>
-            <p:ph type="sldImg" idx="2"/>
-          </p:nvPr>
-        </p:nvSpPr>
-        <p:spPr>
-          <a:xfrm>
-            <a:off x="1576388" y="1143000"/>
-            <a:ext cx="3705225" cy="3086100"/>
-          </a:xfrm>
-          <a:prstGeom prst="rect">
-            <a:avLst/>
-          </a:prstGeom>
-          <a:noFill/>
-          <a:ln w="12700">
-            <a:solidFill>
-              <a:prstClr val="black"/>
-            </a:solidFill>
-          </a:ln>
-        </p:spPr>
-        <p:txBody>
-          <a:bodyPr vert="horz" lIns="91440" tIns="45720" rIns="91440" bIns="45720" rtlCol="0" anchor="ctr"/>
-          <a:lstStyle/>
-          <a:p>
-            <a:endParaRPr lang="en-GB"/>
-          </a:p>
-        </p:txBody>
-      </p:sp>
-      <p:sp>
-        <p:nvSpPr>
-          <p:cNvPr id="5" name="Notes Placeholder 4"/>
-          <p:cNvSpPr>
-            <a:spLocks noGrp="1"/>
-          </p:cNvSpPr>
-          <p:nvPr>
-            <p:ph type="body" sz="quarter" idx="3"/>
-          </p:nvPr>
-        </p:nvSpPr>
-        <p:spPr>
-          <a:xfrm>
-            <a:off x="685800" y="4400550"/>
-            <a:ext cx="5486400" cy="3600450"/>
-          </a:xfrm>
-          <a:prstGeom prst="rect">
-            <a:avLst/>
-          </a:prstGeom>
-        </p:spPr>
-        <p:txBody>
-          <a:bodyPr vert="horz" lIns="91440" tIns="45720" rIns="91440" bIns="45720" rtlCol="0"/>
-          <a:lstStyle/>
-          <a:p>
-            <a:pPr lvl="0"/>
-            <a:r>
-              <a:rPr lang="en-GB"/>
-              <a:t>Click to edit Master text styles</a:t>
-            </a:r>
-          </a:p>
-          <a:p>
-            <a:pPr lvl="1"/>
-            <a:r>
-              <a:rPr lang="en-GB"/>
-              <a:t>Second level</a:t>
-            </a:r>
-          </a:p>
-          <a:p>
-            <a:pPr lvl="2"/>
-            <a:r>
-              <a:rPr lang="en-GB"/>
-              <a:t>Third level</a:t>
-            </a:r>
-          </a:p>
-          <a:p>
-            <a:pPr lvl="3"/>
-            <a:r>
-              <a:rPr lang="en-GB"/>
-              <a:t>Fourth level</a:t>
-            </a:r>
-          </a:p>
-          <a:p>
-            <a:pPr lvl="4"/>
-            <a:r>
-              <a:rPr lang="en-GB"/>
-              <a:t>Fifth level</a:t>
-            </a:r>
-          </a:p>
-        </p:txBody>
-      </p:sp>
-      <p:sp>
-        <p:nvSpPr>
-          <p:cNvPr id="6" name="Footer Placeholder 5"/>
-          <p:cNvSpPr>
-            <a:spLocks noGrp="1"/>
-          </p:cNvSpPr>
-          <p:nvPr>
-            <p:ph type="ftr" sz="quarter" idx="4"/>
-          </p:nvPr>
-        </p:nvSpPr>
-        <p:spPr>
-          <a:xfrm>
-            <a:off x="0" y="8685213"/>
-            <a:ext cx="2971800" cy="458787"/>
-          </a:xfrm>
-          <a:prstGeom prst="rect">
-            <a:avLst/>
-          </a:prstGeom>
-        </p:spPr>
-        <p:txBody>
-          <a:bodyPr vert="horz" lIns="91440" tIns="45720" rIns="91440" bIns="45720" rtlCol="0" anchor="b"/>
-          <a:lstStyle>
-            <a:lvl1pPr algn="l">
-              <a:defRPr sz="1200"/>
-            </a:lvl1pPr>
-          </a:lstStyle>
-          <a:p>
-            <a:endParaRPr lang="en-GB"/>
-          </a:p>
-        </p:txBody>
-      </p:sp>
-      <p:sp>
-        <p:nvSpPr>
-          <p:cNvPr id="7" name="Slide Number Placeholder 6"/>
-          <p:cNvSpPr>
-            <a:spLocks noGrp="1"/>
-          </p:cNvSpPr>
-          <p:nvPr>
-            <p:ph type="sldNum" sz="quarter" idx="5"/>
-          </p:nvPr>
-        </p:nvSpPr>
-        <p:spPr>
-          <a:xfrm>
-            <a:off x="3884613" y="8685213"/>
-            <a:ext cx="2971800" cy="458787"/>
-          </a:xfrm>
-          <a:prstGeom prst="rect">
-            <a:avLst/>
-          </a:prstGeom>
-        </p:spPr>
-        <p:txBody>
-          <a:bodyPr vert="horz" lIns="91440" tIns="45720" rIns="91440" bIns="45720" rtlCol="0" anchor="b"/>
-          <a:lstStyle>
-            <a:lvl1pPr algn="r">
-              <a:defRPr sz="1200"/>
-            </a:lvl1pPr>
-          </a:lstStyle>
-          <a:p>
-            <a:fld id="{081E5005-6ADA-BF49-9779-9D293ABCBF78}" type="slidenum">
-              <a:rPr lang="en-GB" smtClean="0"/>
-              <a:t>‹#›</a:t>
-            </a:fld>
-            <a:endParaRPr lang="en-GB"/>
-          </a:p>
-        </p:txBody>
-      </p:sp>
-    </p:spTree>
-    <p:extLst>
-      <p:ext uri="{BB962C8B-B14F-4D97-AF65-F5344CB8AC3E}">
-        <p14:creationId xmlns:p14="http://schemas.microsoft.com/office/powerpoint/2010/main" val="1923169130"/>
-      </p:ext>
-    </p:extLst>
-  </p:cSld>
-  <p:clrMap bg1="lt1" tx1="dk1" bg2="lt2" tx2="dk2" accent1="accent1" accent2="accent2" accent3="accent3" accent4="accent4" accent5="accent5" accent6="accent6" hlink="hlink" folHlink="folHlink"/>
-  <p:notesStyle>
-    <a:lvl1pPr marL="0" algn="l" defTabSz="914400" rtl="0" eaLnBrk="1" latinLnBrk="0" hangingPunct="1">
-      <a:defRPr sz="1200" kern="1200">
-        <a:solidFill>
-          <a:schemeClr val="tx1"/>
-        </a:solidFill>
-        <a:latin typeface="+mn-lt"/>
-        <a:ea typeface="+mn-ea"/>
-        <a:cs typeface="+mn-cs"/>
-      </a:defRPr>
-    </a:lvl1pPr>
-    <a:lvl2pPr marL="457200" algn="l" defTabSz="914400" rtl="0" eaLnBrk="1" latinLnBrk="0" hangingPunct="1">
-      <a:defRPr sz="1200" kern="1200">
-        <a:solidFill>
-          <a:schemeClr val="tx1"/>
-        </a:solidFill>
-        <a:latin typeface="+mn-lt"/>
-        <a:ea typeface="+mn-ea"/>
-        <a:cs typeface="+mn-cs"/>
-      </a:defRPr>
-    </a:lvl2pPr>
-    <a:lvl3pPr marL="914400" algn="l" defTabSz="914400" rtl="0" eaLnBrk="1" latinLnBrk="0" hangingPunct="1">
-      <a:defRPr sz="1200" kern="1200">
-        <a:solidFill>
-          <a:schemeClr val="tx1"/>
-        </a:solidFill>
-        <a:latin typeface="+mn-lt"/>
-        <a:ea typeface="+mn-ea"/>
-        <a:cs typeface="+mn-cs"/>
-      </a:defRPr>
-    </a:lvl3pPr>
-    <a:lvl4pPr marL="1371600" algn="l" defTabSz="914400" rtl="0" eaLnBrk="1" latinLnBrk="0" hangingPunct="1">
-      <a:defRPr sz="1200" kern="1200">
-        <a:solidFill>
-          <a:schemeClr val="tx1"/>
-        </a:solidFill>
-        <a:latin typeface="+mn-lt"/>
-        <a:ea typeface="+mn-ea"/>
-        <a:cs typeface="+mn-cs"/>
-      </a:defRPr>
-    </a:lvl4pPr>
-    <a:lvl5pPr marL="1828800" algn="l" defTabSz="914400" rtl="0" eaLnBrk="1" latinLnBrk="0" hangingPunct="1">
-      <a:defRPr sz="1200" kern="1200">
-        <a:solidFill>
-          <a:schemeClr val="tx1"/>
-        </a:solidFill>
-        <a:latin typeface="+mn-lt"/>
-        <a:ea typeface="+mn-ea"/>
-        <a:cs typeface="+mn-cs"/>
-      </a:defRPr>
-    </a:lvl5pPr>
-    <a:lvl6pPr marL="2286000" algn="l" defTabSz="914400" rtl="0" eaLnBrk="1" latinLnBrk="0" hangingPunct="1">
-      <a:defRPr sz="1200" kern="1200">
-        <a:solidFill>
-          <a:schemeClr val="tx1"/>
-        </a:solidFill>
-        <a:latin typeface="+mn-lt"/>
-        <a:ea typeface="+mn-ea"/>
-        <a:cs typeface="+mn-cs"/>
-      </a:defRPr>
-    </a:lvl6pPr>
-    <a:lvl7pPr marL="2743200" algn="l" defTabSz="914400" rtl="0" eaLnBrk="1" latinLnBrk="0" hangingPunct="1">
-      <a:defRPr sz="1200" kern="1200">
-        <a:solidFill>
-          <a:schemeClr val="tx1"/>
-        </a:solidFill>
-        <a:latin typeface="+mn-lt"/>
-        <a:ea typeface="+mn-ea"/>
-        <a:cs typeface="+mn-cs"/>
-      </a:defRPr>
-    </a:lvl7pPr>
-    <a:lvl8pPr marL="3200400" algn="l" defTabSz="914400" rtl="0" eaLnBrk="1" latinLnBrk="0" hangingPunct="1">
-      <a:defRPr sz="1200" kern="1200">
-        <a:solidFill>
-          <a:schemeClr val="tx1"/>
-        </a:solidFill>
-        <a:latin typeface="+mn-lt"/>
-        <a:ea typeface="+mn-ea"/>
-        <a:cs typeface="+mn-cs"/>
-      </a:defRPr>
-    </a:lvl8pPr>
-    <a:lvl9pPr marL="3657600" algn="l" defTabSz="914400" rtl="0" eaLnBrk="1" latinLnBrk="0" hangingPunct="1">
-      <a:defRPr sz="1200" kern="1200">
-        <a:solidFill>
-          <a:schemeClr val="tx1"/>
-        </a:solidFill>
-        <a:latin typeface="+mn-lt"/>
-        <a:ea typeface="+mn-ea"/>
-        <a:cs typeface="+mn-cs"/>
-      </a:defRPr>
-    </a:lvl9pPr>
-  </p:notesStyle>
-</p:notesMaster>
-</file>
-
-<file path=ppt/notesSlides/notesSlide1.xml><?xml version="1.0" encoding="utf-8"?>
-<p:notes xmlns:a="http://schemas.openxmlformats.org/drawingml/2006/main" xmlns:r="http://schemas.openxmlformats.org/officeDocument/2006/relationships" xmlns:p="http://schemas.openxmlformats.org/presentationml/2006/main">
-  <p:cSld>
-    <p:spTree>
-      <p:nvGrpSpPr>
-        <p:cNvPr id="1" name=""/>
-        <p:cNvGrpSpPr/>
-        <p:nvPr/>
-      </p:nvGrpSpPr>
-      <p:grpSpPr>
-        <a:xfrm>
-          <a:off x="0" y="0"/>
-          <a:ext cx="0" cy="0"/>
-          <a:chOff x="0" y="0"/>
-          <a:chExt cx="0" cy="0"/>
-        </a:xfrm>
-      </p:grpSpPr>
-      <p:sp>
-        <p:nvSpPr>
-          <p:cNvPr id="2" name="Slide Image Placeholder 1"/>
-          <p:cNvSpPr>
-            <a:spLocks noGrp="1" noRot="1" noChangeAspect="1"/>
-          </p:cNvSpPr>
-          <p:nvPr>
-            <p:ph type="sldImg"/>
-          </p:nvPr>
-        </p:nvSpPr>
-        <p:spPr/>
-      </p:sp>
-      <p:sp>
-        <p:nvSpPr>
-          <p:cNvPr id="3" name="Notes Placeholder 2"/>
-          <p:cNvSpPr>
-            <a:spLocks noGrp="1"/>
-          </p:cNvSpPr>
-          <p:nvPr>
-            <p:ph type="body" idx="1"/>
-          </p:nvPr>
-        </p:nvSpPr>
-        <p:spPr/>
-        <p:txBody>
-          <a:bodyPr/>
-          <a:lstStyle/>
-          <a:p>
-            <a:r>
-              <a:rPr lang="en-US" dirty="0"/>
-              <a:t>Pythagoras tree without the trunk (possibly a type of dragon curve?)</a:t>
-            </a:r>
-          </a:p>
-        </p:txBody>
-      </p:sp>
-      <p:sp>
-        <p:nvSpPr>
-          <p:cNvPr id="4" name="Slide Number Placeholder 3"/>
-          <p:cNvSpPr>
-            <a:spLocks noGrp="1"/>
-          </p:cNvSpPr>
-          <p:nvPr>
-            <p:ph type="sldNum" sz="quarter" idx="5"/>
-          </p:nvPr>
-        </p:nvSpPr>
-        <p:spPr/>
-        <p:txBody>
-          <a:bodyPr/>
-          <a:lstStyle/>
-          <a:p>
-            <a:fld id="{825676C3-AF84-0440-9FDE-505F611B6232}" type="slidenum">
-              <a:rPr lang="en-GB" smtClean="0"/>
-              <a:t>1</a:t>
-            </a:fld>
-            <a:endParaRPr lang="en-GB"/>
-          </a:p>
-        </p:txBody>
-      </p:sp>
-    </p:spTree>
-    <p:extLst>
-      <p:ext uri="{BB962C8B-B14F-4D97-AF65-F5344CB8AC3E}">
-        <p14:creationId xmlns:p14="http://schemas.microsoft.com/office/powerpoint/2010/main" val="1893552586"/>
-      </p:ext>
-    </p:extLst>
-  </p:cSld>
-  <p:clrMapOvr>
-    <a:masterClrMapping/>
-  </p:clrMapOvr>
-</p:notes>
 </file>
 
 <file path=ppt/slideLayouts/slideLayout1.xml><?xml version="1.0" encoding="utf-8"?>
@@ -580,15 +136,15 @@
         </p:nvSpPr>
         <p:spPr>
           <a:xfrm>
-            <a:off x="648057" y="1178222"/>
-            <a:ext cx="7344649" cy="2506427"/>
+            <a:off x="648057" y="1001553"/>
+            <a:ext cx="7344649" cy="2130602"/>
           </a:xfrm>
         </p:spPr>
         <p:txBody>
           <a:bodyPr anchor="b"/>
           <a:lstStyle>
             <a:lvl1pPr algn="ctr">
-              <a:defRPr sz="5670"/>
+              <a:defRPr sz="5354"/>
             </a:lvl1pPr>
           </a:lstStyle>
           <a:p>
@@ -612,8 +168,8 @@
         </p:nvSpPr>
         <p:spPr>
           <a:xfrm>
-            <a:off x="1080096" y="3781306"/>
-            <a:ext cx="6480572" cy="1738167"/>
+            <a:off x="1080096" y="3214319"/>
+            <a:ext cx="6480572" cy="1477538"/>
           </a:xfrm>
         </p:spPr>
         <p:txBody>
@@ -621,39 +177,39 @@
           <a:lstStyle>
             <a:lvl1pPr marL="0" indent="0" algn="ctr">
               <a:buNone/>
-              <a:defRPr sz="2268"/>
+              <a:defRPr sz="2142"/>
             </a:lvl1pPr>
-            <a:lvl2pPr marL="432054" indent="0" algn="ctr">
-              <a:buNone/>
-              <a:defRPr sz="1890"/>
+            <a:lvl2pPr marL="408005" indent="0" algn="ctr">
+              <a:buNone/>
+              <a:defRPr sz="1785"/>
             </a:lvl2pPr>
-            <a:lvl3pPr marL="864108" indent="0" algn="ctr">
-              <a:buNone/>
-              <a:defRPr sz="1701"/>
+            <a:lvl3pPr marL="816011" indent="0" algn="ctr">
+              <a:buNone/>
+              <a:defRPr sz="1606"/>
             </a:lvl3pPr>
-            <a:lvl4pPr marL="1296162" indent="0" algn="ctr">
-              <a:buNone/>
-              <a:defRPr sz="1512"/>
+            <a:lvl4pPr marL="1224016" indent="0" algn="ctr">
+              <a:buNone/>
+              <a:defRPr sz="1428"/>
             </a:lvl4pPr>
-            <a:lvl5pPr marL="1728216" indent="0" algn="ctr">
-              <a:buNone/>
-              <a:defRPr sz="1512"/>
+            <a:lvl5pPr marL="1632021" indent="0" algn="ctr">
+              <a:buNone/>
+              <a:defRPr sz="1428"/>
             </a:lvl5pPr>
-            <a:lvl6pPr marL="2160270" indent="0" algn="ctr">
-              <a:buNone/>
-              <a:defRPr sz="1512"/>
+            <a:lvl6pPr marL="2040026" indent="0" algn="ctr">
+              <a:buNone/>
+              <a:defRPr sz="1428"/>
             </a:lvl6pPr>
-            <a:lvl7pPr marL="2592324" indent="0" algn="ctr">
-              <a:buNone/>
-              <a:defRPr sz="1512"/>
+            <a:lvl7pPr marL="2448032" indent="0" algn="ctr">
+              <a:buNone/>
+              <a:defRPr sz="1428"/>
             </a:lvl7pPr>
-            <a:lvl8pPr marL="3024378" indent="0" algn="ctr">
-              <a:buNone/>
-              <a:defRPr sz="1512"/>
+            <a:lvl8pPr marL="2856037" indent="0" algn="ctr">
+              <a:buNone/>
+              <a:defRPr sz="1428"/>
             </a:lvl8pPr>
-            <a:lvl9pPr marL="3456432" indent="0" algn="ctr">
-              <a:buNone/>
-              <a:defRPr sz="1512"/>
+            <a:lvl9pPr marL="3264042" indent="0" algn="ctr">
+              <a:buNone/>
+              <a:defRPr sz="1428"/>
             </a:lvl9pPr>
           </a:lstStyle>
           <a:p>
@@ -680,9 +236,9 @@
           <a:bodyPr/>
           <a:lstStyle/>
           <a:p>
-            <a:fld id="{CD0E8049-E101-1D4D-AC32-01FB6D0C811C}" type="datetimeFigureOut">
+            <a:fld id="{B681DD06-4446-3540-B2FF-84F971E3DC52}" type="datetimeFigureOut">
               <a:rPr lang="en-GB" smtClean="0"/>
-              <a:t>07/07/2024</a:t>
+              <a:t>29/10/2024</a:t>
             </a:fld>
             <a:endParaRPr lang="en-GB"/>
           </a:p>
@@ -722,7 +278,7 @@
           <a:bodyPr/>
           <a:lstStyle/>
           <a:p>
-            <a:fld id="{4EE1162B-F7B0-CE4A-9E53-09DAE08FBC24}" type="slidenum">
+            <a:fld id="{EECF5340-C9EA-3B4C-9024-1A3D501BE071}" type="slidenum">
               <a:rPr lang="en-GB" smtClean="0"/>
               <a:t>‹#›</a:t>
             </a:fld>
@@ -733,7 +289,7 @@
     </p:spTree>
     <p:extLst>
       <p:ext uri="{BB962C8B-B14F-4D97-AF65-F5344CB8AC3E}">
-        <p14:creationId xmlns:p14="http://schemas.microsoft.com/office/powerpoint/2010/main" val="3416360676"/>
+        <p14:creationId xmlns:p14="http://schemas.microsoft.com/office/powerpoint/2010/main" val="2830587344"/>
       </p:ext>
     </p:extLst>
   </p:cSld>
@@ -850,9 +406,9 @@
           <a:bodyPr/>
           <a:lstStyle/>
           <a:p>
-            <a:fld id="{CD0E8049-E101-1D4D-AC32-01FB6D0C811C}" type="datetimeFigureOut">
+            <a:fld id="{B681DD06-4446-3540-B2FF-84F971E3DC52}" type="datetimeFigureOut">
               <a:rPr lang="en-GB" smtClean="0"/>
-              <a:t>07/07/2024</a:t>
+              <a:t>29/10/2024</a:t>
             </a:fld>
             <a:endParaRPr lang="en-GB"/>
           </a:p>
@@ -892,7 +448,7 @@
           <a:bodyPr/>
           <a:lstStyle/>
           <a:p>
-            <a:fld id="{4EE1162B-F7B0-CE4A-9E53-09DAE08FBC24}" type="slidenum">
+            <a:fld id="{EECF5340-C9EA-3B4C-9024-1A3D501BE071}" type="slidenum">
               <a:rPr lang="en-GB" smtClean="0"/>
               <a:t>‹#›</a:t>
             </a:fld>
@@ -903,7 +459,7 @@
     </p:spTree>
     <p:extLst>
       <p:ext uri="{BB962C8B-B14F-4D97-AF65-F5344CB8AC3E}">
-        <p14:creationId xmlns:p14="http://schemas.microsoft.com/office/powerpoint/2010/main" val="3561132469"/>
+        <p14:creationId xmlns:p14="http://schemas.microsoft.com/office/powerpoint/2010/main" val="37946390"/>
       </p:ext>
     </p:extLst>
   </p:cSld>
@@ -942,8 +498,8 @@
         </p:nvSpPr>
         <p:spPr>
           <a:xfrm>
-            <a:off x="6183546" y="383297"/>
-            <a:ext cx="1863165" cy="6101085"/>
+            <a:off x="6183546" y="325823"/>
+            <a:ext cx="1863165" cy="5186259"/>
           </a:xfrm>
         </p:spPr>
         <p:txBody>
@@ -970,8 +526,8 @@
         </p:nvSpPr>
         <p:spPr>
           <a:xfrm>
-            <a:off x="594053" y="383297"/>
-            <a:ext cx="5481484" cy="6101085"/>
+            <a:off x="594053" y="325823"/>
+            <a:ext cx="5481484" cy="5186259"/>
           </a:xfrm>
         </p:spPr>
         <p:txBody>
@@ -1030,9 +586,9 @@
           <a:bodyPr/>
           <a:lstStyle/>
           <a:p>
-            <a:fld id="{CD0E8049-E101-1D4D-AC32-01FB6D0C811C}" type="datetimeFigureOut">
+            <a:fld id="{B681DD06-4446-3540-B2FF-84F971E3DC52}" type="datetimeFigureOut">
               <a:rPr lang="en-GB" smtClean="0"/>
-              <a:t>07/07/2024</a:t>
+              <a:t>29/10/2024</a:t>
             </a:fld>
             <a:endParaRPr lang="en-GB"/>
           </a:p>
@@ -1072,7 +628,7 @@
           <a:bodyPr/>
           <a:lstStyle/>
           <a:p>
-            <a:fld id="{4EE1162B-F7B0-CE4A-9E53-09DAE08FBC24}" type="slidenum">
+            <a:fld id="{EECF5340-C9EA-3B4C-9024-1A3D501BE071}" type="slidenum">
               <a:rPr lang="en-GB" smtClean="0"/>
               <a:t>‹#›</a:t>
             </a:fld>
@@ -1083,7 +639,7 @@
     </p:spTree>
     <p:extLst>
       <p:ext uri="{BB962C8B-B14F-4D97-AF65-F5344CB8AC3E}">
-        <p14:creationId xmlns:p14="http://schemas.microsoft.com/office/powerpoint/2010/main" val="844193194"/>
+        <p14:creationId xmlns:p14="http://schemas.microsoft.com/office/powerpoint/2010/main" val="3498507735"/>
       </p:ext>
     </p:extLst>
   </p:cSld>
@@ -1200,9 +756,9 @@
           <a:bodyPr/>
           <a:lstStyle/>
           <a:p>
-            <a:fld id="{CD0E8049-E101-1D4D-AC32-01FB6D0C811C}" type="datetimeFigureOut">
+            <a:fld id="{B681DD06-4446-3540-B2FF-84F971E3DC52}" type="datetimeFigureOut">
               <a:rPr lang="en-GB" smtClean="0"/>
-              <a:t>07/07/2024</a:t>
+              <a:t>29/10/2024</a:t>
             </a:fld>
             <a:endParaRPr lang="en-GB"/>
           </a:p>
@@ -1242,7 +798,7 @@
           <a:bodyPr/>
           <a:lstStyle/>
           <a:p>
-            <a:fld id="{4EE1162B-F7B0-CE4A-9E53-09DAE08FBC24}" type="slidenum">
+            <a:fld id="{EECF5340-C9EA-3B4C-9024-1A3D501BE071}" type="slidenum">
               <a:rPr lang="en-GB" smtClean="0"/>
               <a:t>‹#›</a:t>
             </a:fld>
@@ -1253,7 +809,7 @@
     </p:spTree>
     <p:extLst>
       <p:ext uri="{BB962C8B-B14F-4D97-AF65-F5344CB8AC3E}">
-        <p14:creationId xmlns:p14="http://schemas.microsoft.com/office/powerpoint/2010/main" val="4122934017"/>
+        <p14:creationId xmlns:p14="http://schemas.microsoft.com/office/powerpoint/2010/main" val="14682709"/>
       </p:ext>
     </p:extLst>
   </p:cSld>
@@ -1292,15 +848,15 @@
         </p:nvSpPr>
         <p:spPr>
           <a:xfrm>
-            <a:off x="589553" y="1794831"/>
-            <a:ext cx="7452658" cy="2994714"/>
+            <a:off x="589553" y="1525705"/>
+            <a:ext cx="7452658" cy="2545672"/>
           </a:xfrm>
         </p:spPr>
         <p:txBody>
           <a:bodyPr anchor="b"/>
           <a:lstStyle>
             <a:lvl1pPr>
-              <a:defRPr sz="5670"/>
+              <a:defRPr sz="5354"/>
             </a:lvl1pPr>
           </a:lstStyle>
           <a:p>
@@ -1324,8 +880,8 @@
         </p:nvSpPr>
         <p:spPr>
           <a:xfrm>
-            <a:off x="589553" y="4817876"/>
-            <a:ext cx="7452658" cy="1574849"/>
+            <a:off x="589553" y="4095460"/>
+            <a:ext cx="7452658" cy="1338709"/>
           </a:xfrm>
         </p:spPr>
         <p:txBody>
@@ -1333,15 +889,15 @@
           <a:lstStyle>
             <a:lvl1pPr marL="0" indent="0">
               <a:buNone/>
-              <a:defRPr sz="2268">
+              <a:defRPr sz="2142">
                 <a:solidFill>
                   <a:schemeClr val="tx1"/>
                 </a:solidFill>
               </a:defRPr>
             </a:lvl1pPr>
-            <a:lvl2pPr marL="432054" indent="0">
-              <a:buNone/>
-              <a:defRPr sz="1890">
+            <a:lvl2pPr marL="408005" indent="0">
+              <a:buNone/>
+              <a:defRPr sz="1785">
                 <a:solidFill>
                   <a:schemeClr val="tx1">
                     <a:tint val="75000"/>
@@ -1349,9 +905,9 @@
                 </a:solidFill>
               </a:defRPr>
             </a:lvl2pPr>
-            <a:lvl3pPr marL="864108" indent="0">
-              <a:buNone/>
-              <a:defRPr sz="1701">
+            <a:lvl3pPr marL="816011" indent="0">
+              <a:buNone/>
+              <a:defRPr sz="1606">
                 <a:solidFill>
                   <a:schemeClr val="tx1">
                     <a:tint val="75000"/>
@@ -1359,9 +915,9 @@
                 </a:solidFill>
               </a:defRPr>
             </a:lvl3pPr>
-            <a:lvl4pPr marL="1296162" indent="0">
-              <a:buNone/>
-              <a:defRPr sz="1512">
+            <a:lvl4pPr marL="1224016" indent="0">
+              <a:buNone/>
+              <a:defRPr sz="1428">
                 <a:solidFill>
                   <a:schemeClr val="tx1">
                     <a:tint val="75000"/>
@@ -1369,9 +925,9 @@
                 </a:solidFill>
               </a:defRPr>
             </a:lvl4pPr>
-            <a:lvl5pPr marL="1728216" indent="0">
-              <a:buNone/>
-              <a:defRPr sz="1512">
+            <a:lvl5pPr marL="1632021" indent="0">
+              <a:buNone/>
+              <a:defRPr sz="1428">
                 <a:solidFill>
                   <a:schemeClr val="tx1">
                     <a:tint val="75000"/>
@@ -1379,9 +935,9 @@
                 </a:solidFill>
               </a:defRPr>
             </a:lvl5pPr>
-            <a:lvl6pPr marL="2160270" indent="0">
-              <a:buNone/>
-              <a:defRPr sz="1512">
+            <a:lvl6pPr marL="2040026" indent="0">
+              <a:buNone/>
+              <a:defRPr sz="1428">
                 <a:solidFill>
                   <a:schemeClr val="tx1">
                     <a:tint val="75000"/>
@@ -1389,9 +945,9 @@
                 </a:solidFill>
               </a:defRPr>
             </a:lvl6pPr>
-            <a:lvl7pPr marL="2592324" indent="0">
-              <a:buNone/>
-              <a:defRPr sz="1512">
+            <a:lvl7pPr marL="2448032" indent="0">
+              <a:buNone/>
+              <a:defRPr sz="1428">
                 <a:solidFill>
                   <a:schemeClr val="tx1">
                     <a:tint val="75000"/>
@@ -1399,9 +955,9 @@
                 </a:solidFill>
               </a:defRPr>
             </a:lvl7pPr>
-            <a:lvl8pPr marL="3024378" indent="0">
-              <a:buNone/>
-              <a:defRPr sz="1512">
+            <a:lvl8pPr marL="2856037" indent="0">
+              <a:buNone/>
+              <a:defRPr sz="1428">
                 <a:solidFill>
                   <a:schemeClr val="tx1">
                     <a:tint val="75000"/>
@@ -1409,9 +965,9 @@
                 </a:solidFill>
               </a:defRPr>
             </a:lvl8pPr>
-            <a:lvl9pPr marL="3456432" indent="0">
-              <a:buNone/>
-              <a:defRPr sz="1512">
+            <a:lvl9pPr marL="3264042" indent="0">
+              <a:buNone/>
+              <a:defRPr sz="1428">
                 <a:solidFill>
                   <a:schemeClr val="tx1">
                     <a:tint val="75000"/>
@@ -1444,9 +1000,9 @@
           <a:bodyPr/>
           <a:lstStyle/>
           <a:p>
-            <a:fld id="{CD0E8049-E101-1D4D-AC32-01FB6D0C811C}" type="datetimeFigureOut">
+            <a:fld id="{B681DD06-4446-3540-B2FF-84F971E3DC52}" type="datetimeFigureOut">
               <a:rPr lang="en-GB" smtClean="0"/>
-              <a:t>07/07/2024</a:t>
+              <a:t>29/10/2024</a:t>
             </a:fld>
             <a:endParaRPr lang="en-GB"/>
           </a:p>
@@ -1486,7 +1042,7 @@
           <a:bodyPr/>
           <a:lstStyle/>
           <a:p>
-            <a:fld id="{4EE1162B-F7B0-CE4A-9E53-09DAE08FBC24}" type="slidenum">
+            <a:fld id="{EECF5340-C9EA-3B4C-9024-1A3D501BE071}" type="slidenum">
               <a:rPr lang="en-GB" smtClean="0"/>
               <a:t>‹#›</a:t>
             </a:fld>
@@ -1497,7 +1053,7 @@
     </p:spTree>
     <p:extLst>
       <p:ext uri="{BB962C8B-B14F-4D97-AF65-F5344CB8AC3E}">
-        <p14:creationId xmlns:p14="http://schemas.microsoft.com/office/powerpoint/2010/main" val="1077161019"/>
+        <p14:creationId xmlns:p14="http://schemas.microsoft.com/office/powerpoint/2010/main" val="641664123"/>
       </p:ext>
     </p:extLst>
   </p:cSld>
@@ -1559,8 +1115,8 @@
         </p:nvSpPr>
         <p:spPr>
           <a:xfrm>
-            <a:off x="594053" y="1916484"/>
-            <a:ext cx="3672324" cy="4567898"/>
+            <a:off x="594053" y="1629117"/>
+            <a:ext cx="3672324" cy="3882965"/>
           </a:xfrm>
         </p:spPr>
         <p:txBody>
@@ -1616,8 +1172,8 @@
         </p:nvSpPr>
         <p:spPr>
           <a:xfrm>
-            <a:off x="4374386" y="1916484"/>
-            <a:ext cx="3672324" cy="4567898"/>
+            <a:off x="4374386" y="1629117"/>
+            <a:ext cx="3672324" cy="3882965"/>
           </a:xfrm>
         </p:spPr>
         <p:txBody>
@@ -1676,9 +1232,9 @@
           <a:bodyPr/>
           <a:lstStyle/>
           <a:p>
-            <a:fld id="{CD0E8049-E101-1D4D-AC32-01FB6D0C811C}" type="datetimeFigureOut">
+            <a:fld id="{B681DD06-4446-3540-B2FF-84F971E3DC52}" type="datetimeFigureOut">
               <a:rPr lang="en-GB" smtClean="0"/>
-              <a:t>07/07/2024</a:t>
+              <a:t>29/10/2024</a:t>
             </a:fld>
             <a:endParaRPr lang="en-GB"/>
           </a:p>
@@ -1718,7 +1274,7 @@
           <a:bodyPr/>
           <a:lstStyle/>
           <a:p>
-            <a:fld id="{4EE1162B-F7B0-CE4A-9E53-09DAE08FBC24}" type="slidenum">
+            <a:fld id="{EECF5340-C9EA-3B4C-9024-1A3D501BE071}" type="slidenum">
               <a:rPr lang="en-GB" smtClean="0"/>
               <a:t>‹#›</a:t>
             </a:fld>
@@ -1729,7 +1285,7 @@
     </p:spTree>
     <p:extLst>
       <p:ext uri="{BB962C8B-B14F-4D97-AF65-F5344CB8AC3E}">
-        <p14:creationId xmlns:p14="http://schemas.microsoft.com/office/powerpoint/2010/main" val="2295410239"/>
+        <p14:creationId xmlns:p14="http://schemas.microsoft.com/office/powerpoint/2010/main" val="4078415062"/>
       </p:ext>
     </p:extLst>
   </p:cSld>
@@ -1768,8 +1324,8 @@
         </p:nvSpPr>
         <p:spPr>
           <a:xfrm>
-            <a:off x="595178" y="383299"/>
-            <a:ext cx="7452658" cy="1391534"/>
+            <a:off x="595178" y="325825"/>
+            <a:ext cx="7452658" cy="1182881"/>
           </a:xfrm>
         </p:spPr>
         <p:txBody>
@@ -1796,8 +1352,8 @@
         </p:nvSpPr>
         <p:spPr>
           <a:xfrm>
-            <a:off x="595179" y="1764832"/>
-            <a:ext cx="3655447" cy="864917"/>
+            <a:off x="595179" y="1500205"/>
+            <a:ext cx="3655447" cy="735227"/>
           </a:xfrm>
         </p:spPr>
         <p:txBody>
@@ -1805,39 +1361,39 @@
           <a:lstStyle>
             <a:lvl1pPr marL="0" indent="0">
               <a:buNone/>
-              <a:defRPr sz="2268" b="1"/>
+              <a:defRPr sz="2142" b="1"/>
             </a:lvl1pPr>
-            <a:lvl2pPr marL="432054" indent="0">
-              <a:buNone/>
-              <a:defRPr sz="1890" b="1"/>
+            <a:lvl2pPr marL="408005" indent="0">
+              <a:buNone/>
+              <a:defRPr sz="1785" b="1"/>
             </a:lvl2pPr>
-            <a:lvl3pPr marL="864108" indent="0">
-              <a:buNone/>
-              <a:defRPr sz="1701" b="1"/>
+            <a:lvl3pPr marL="816011" indent="0">
+              <a:buNone/>
+              <a:defRPr sz="1606" b="1"/>
             </a:lvl3pPr>
-            <a:lvl4pPr marL="1296162" indent="0">
-              <a:buNone/>
-              <a:defRPr sz="1512" b="1"/>
+            <a:lvl4pPr marL="1224016" indent="0">
+              <a:buNone/>
+              <a:defRPr sz="1428" b="1"/>
             </a:lvl4pPr>
-            <a:lvl5pPr marL="1728216" indent="0">
-              <a:buNone/>
-              <a:defRPr sz="1512" b="1"/>
+            <a:lvl5pPr marL="1632021" indent="0">
+              <a:buNone/>
+              <a:defRPr sz="1428" b="1"/>
             </a:lvl5pPr>
-            <a:lvl6pPr marL="2160270" indent="0">
-              <a:buNone/>
-              <a:defRPr sz="1512" b="1"/>
+            <a:lvl6pPr marL="2040026" indent="0">
+              <a:buNone/>
+              <a:defRPr sz="1428" b="1"/>
             </a:lvl6pPr>
-            <a:lvl7pPr marL="2592324" indent="0">
-              <a:buNone/>
-              <a:defRPr sz="1512" b="1"/>
+            <a:lvl7pPr marL="2448032" indent="0">
+              <a:buNone/>
+              <a:defRPr sz="1428" b="1"/>
             </a:lvl7pPr>
-            <a:lvl8pPr marL="3024378" indent="0">
-              <a:buNone/>
-              <a:defRPr sz="1512" b="1"/>
+            <a:lvl8pPr marL="2856037" indent="0">
+              <a:buNone/>
+              <a:defRPr sz="1428" b="1"/>
             </a:lvl8pPr>
-            <a:lvl9pPr marL="3456432" indent="0">
-              <a:buNone/>
-              <a:defRPr sz="1512" b="1"/>
+            <a:lvl9pPr marL="3264042" indent="0">
+              <a:buNone/>
+              <a:defRPr sz="1428" b="1"/>
             </a:lvl9pPr>
           </a:lstStyle>
           <a:p>
@@ -1861,8 +1417,8 @@
         </p:nvSpPr>
         <p:spPr>
           <a:xfrm>
-            <a:off x="595179" y="2629749"/>
-            <a:ext cx="3655447" cy="3867965"/>
+            <a:off x="595179" y="2235432"/>
+            <a:ext cx="3655447" cy="3287983"/>
           </a:xfrm>
         </p:spPr>
         <p:txBody>
@@ -1918,8 +1474,8 @@
         </p:nvSpPr>
         <p:spPr>
           <a:xfrm>
-            <a:off x="4374387" y="1764832"/>
-            <a:ext cx="3673450" cy="864917"/>
+            <a:off x="4374387" y="1500205"/>
+            <a:ext cx="3673450" cy="735227"/>
           </a:xfrm>
         </p:spPr>
         <p:txBody>
@@ -1927,39 +1483,39 @@
           <a:lstStyle>
             <a:lvl1pPr marL="0" indent="0">
               <a:buNone/>
-              <a:defRPr sz="2268" b="1"/>
+              <a:defRPr sz="2142" b="1"/>
             </a:lvl1pPr>
-            <a:lvl2pPr marL="432054" indent="0">
-              <a:buNone/>
-              <a:defRPr sz="1890" b="1"/>
+            <a:lvl2pPr marL="408005" indent="0">
+              <a:buNone/>
+              <a:defRPr sz="1785" b="1"/>
             </a:lvl2pPr>
-            <a:lvl3pPr marL="864108" indent="0">
-              <a:buNone/>
-              <a:defRPr sz="1701" b="1"/>
+            <a:lvl3pPr marL="816011" indent="0">
+              <a:buNone/>
+              <a:defRPr sz="1606" b="1"/>
             </a:lvl3pPr>
-            <a:lvl4pPr marL="1296162" indent="0">
-              <a:buNone/>
-              <a:defRPr sz="1512" b="1"/>
+            <a:lvl4pPr marL="1224016" indent="0">
+              <a:buNone/>
+              <a:defRPr sz="1428" b="1"/>
             </a:lvl4pPr>
-            <a:lvl5pPr marL="1728216" indent="0">
-              <a:buNone/>
-              <a:defRPr sz="1512" b="1"/>
+            <a:lvl5pPr marL="1632021" indent="0">
+              <a:buNone/>
+              <a:defRPr sz="1428" b="1"/>
             </a:lvl5pPr>
-            <a:lvl6pPr marL="2160270" indent="0">
-              <a:buNone/>
-              <a:defRPr sz="1512" b="1"/>
+            <a:lvl6pPr marL="2040026" indent="0">
+              <a:buNone/>
+              <a:defRPr sz="1428" b="1"/>
             </a:lvl6pPr>
-            <a:lvl7pPr marL="2592324" indent="0">
-              <a:buNone/>
-              <a:defRPr sz="1512" b="1"/>
+            <a:lvl7pPr marL="2448032" indent="0">
+              <a:buNone/>
+              <a:defRPr sz="1428" b="1"/>
             </a:lvl7pPr>
-            <a:lvl8pPr marL="3024378" indent="0">
-              <a:buNone/>
-              <a:defRPr sz="1512" b="1"/>
+            <a:lvl8pPr marL="2856037" indent="0">
+              <a:buNone/>
+              <a:defRPr sz="1428" b="1"/>
             </a:lvl8pPr>
-            <a:lvl9pPr marL="3456432" indent="0">
-              <a:buNone/>
-              <a:defRPr sz="1512" b="1"/>
+            <a:lvl9pPr marL="3264042" indent="0">
+              <a:buNone/>
+              <a:defRPr sz="1428" b="1"/>
             </a:lvl9pPr>
           </a:lstStyle>
           <a:p>
@@ -1983,8 +1539,8 @@
         </p:nvSpPr>
         <p:spPr>
           <a:xfrm>
-            <a:off x="4374387" y="2629749"/>
-            <a:ext cx="3673450" cy="3867965"/>
+            <a:off x="4374387" y="2235432"/>
+            <a:ext cx="3673450" cy="3287983"/>
           </a:xfrm>
         </p:spPr>
         <p:txBody>
@@ -2043,9 +1599,9 @@
           <a:bodyPr/>
           <a:lstStyle/>
           <a:p>
-            <a:fld id="{CD0E8049-E101-1D4D-AC32-01FB6D0C811C}" type="datetimeFigureOut">
+            <a:fld id="{B681DD06-4446-3540-B2FF-84F971E3DC52}" type="datetimeFigureOut">
               <a:rPr lang="en-GB" smtClean="0"/>
-              <a:t>07/07/2024</a:t>
+              <a:t>29/10/2024</a:t>
             </a:fld>
             <a:endParaRPr lang="en-GB"/>
           </a:p>
@@ -2085,7 +1641,7 @@
           <a:bodyPr/>
           <a:lstStyle/>
           <a:p>
-            <a:fld id="{4EE1162B-F7B0-CE4A-9E53-09DAE08FBC24}" type="slidenum">
+            <a:fld id="{EECF5340-C9EA-3B4C-9024-1A3D501BE071}" type="slidenum">
               <a:rPr lang="en-GB" smtClean="0"/>
               <a:t>‹#›</a:t>
             </a:fld>
@@ -2096,7 +1652,7 @@
     </p:spTree>
     <p:extLst>
       <p:ext uri="{BB962C8B-B14F-4D97-AF65-F5344CB8AC3E}">
-        <p14:creationId xmlns:p14="http://schemas.microsoft.com/office/powerpoint/2010/main" val="1987624071"/>
+        <p14:creationId xmlns:p14="http://schemas.microsoft.com/office/powerpoint/2010/main" val="437123501"/>
       </p:ext>
     </p:extLst>
   </p:cSld>
@@ -2161,9 +1717,9 @@
           <a:bodyPr/>
           <a:lstStyle/>
           <a:p>
-            <a:fld id="{CD0E8049-E101-1D4D-AC32-01FB6D0C811C}" type="datetimeFigureOut">
+            <a:fld id="{B681DD06-4446-3540-B2FF-84F971E3DC52}" type="datetimeFigureOut">
               <a:rPr lang="en-GB" smtClean="0"/>
-              <a:t>07/07/2024</a:t>
+              <a:t>29/10/2024</a:t>
             </a:fld>
             <a:endParaRPr lang="en-GB"/>
           </a:p>
@@ -2203,7 +1759,7 @@
           <a:bodyPr/>
           <a:lstStyle/>
           <a:p>
-            <a:fld id="{4EE1162B-F7B0-CE4A-9E53-09DAE08FBC24}" type="slidenum">
+            <a:fld id="{EECF5340-C9EA-3B4C-9024-1A3D501BE071}" type="slidenum">
               <a:rPr lang="en-GB" smtClean="0"/>
               <a:t>‹#›</a:t>
             </a:fld>
@@ -2214,7 +1770,7 @@
     </p:spTree>
     <p:extLst>
       <p:ext uri="{BB962C8B-B14F-4D97-AF65-F5344CB8AC3E}">
-        <p14:creationId xmlns:p14="http://schemas.microsoft.com/office/powerpoint/2010/main" val="2980058086"/>
+        <p14:creationId xmlns:p14="http://schemas.microsoft.com/office/powerpoint/2010/main" val="3663980360"/>
       </p:ext>
     </p:extLst>
   </p:cSld>
@@ -2256,9 +1812,9 @@
           <a:bodyPr/>
           <a:lstStyle/>
           <a:p>
-            <a:fld id="{CD0E8049-E101-1D4D-AC32-01FB6D0C811C}" type="datetimeFigureOut">
+            <a:fld id="{B681DD06-4446-3540-B2FF-84F971E3DC52}" type="datetimeFigureOut">
               <a:rPr lang="en-GB" smtClean="0"/>
-              <a:t>07/07/2024</a:t>
+              <a:t>29/10/2024</a:t>
             </a:fld>
             <a:endParaRPr lang="en-GB"/>
           </a:p>
@@ -2298,7 +1854,7 @@
           <a:bodyPr/>
           <a:lstStyle/>
           <a:p>
-            <a:fld id="{4EE1162B-F7B0-CE4A-9E53-09DAE08FBC24}" type="slidenum">
+            <a:fld id="{EECF5340-C9EA-3B4C-9024-1A3D501BE071}" type="slidenum">
               <a:rPr lang="en-GB" smtClean="0"/>
               <a:t>‹#›</a:t>
             </a:fld>
@@ -2309,7 +1865,7 @@
     </p:spTree>
     <p:extLst>
       <p:ext uri="{BB962C8B-B14F-4D97-AF65-F5344CB8AC3E}">
-        <p14:creationId xmlns:p14="http://schemas.microsoft.com/office/powerpoint/2010/main" val="3076959254"/>
+        <p14:creationId xmlns:p14="http://schemas.microsoft.com/office/powerpoint/2010/main" val="3659572368"/>
       </p:ext>
     </p:extLst>
   </p:cSld>
@@ -2348,15 +1904,15 @@
         </p:nvSpPr>
         <p:spPr>
           <a:xfrm>
-            <a:off x="595178" y="479954"/>
-            <a:ext cx="2786871" cy="1679840"/>
+            <a:off x="595178" y="407988"/>
+            <a:ext cx="2786871" cy="1427956"/>
           </a:xfrm>
         </p:spPr>
         <p:txBody>
           <a:bodyPr anchor="b"/>
           <a:lstStyle>
             <a:lvl1pPr>
-              <a:defRPr sz="3024"/>
+              <a:defRPr sz="2856"/>
             </a:lvl1pPr>
           </a:lstStyle>
           <a:p>
@@ -2380,39 +1936,39 @@
         </p:nvSpPr>
         <p:spPr>
           <a:xfrm>
-            <a:off x="3673450" y="1036570"/>
-            <a:ext cx="4374386" cy="5116178"/>
+            <a:off x="3673450" y="881141"/>
+            <a:ext cx="4374386" cy="4349034"/>
           </a:xfrm>
         </p:spPr>
         <p:txBody>
           <a:bodyPr/>
           <a:lstStyle>
             <a:lvl1pPr>
-              <a:defRPr sz="3024"/>
+              <a:defRPr sz="2856"/>
             </a:lvl1pPr>
             <a:lvl2pPr>
-              <a:defRPr sz="2646"/>
+              <a:defRPr sz="2499"/>
             </a:lvl2pPr>
             <a:lvl3pPr>
-              <a:defRPr sz="2268"/>
+              <a:defRPr sz="2142"/>
             </a:lvl3pPr>
             <a:lvl4pPr>
-              <a:defRPr sz="1890"/>
+              <a:defRPr sz="1785"/>
             </a:lvl4pPr>
             <a:lvl5pPr>
-              <a:defRPr sz="1890"/>
+              <a:defRPr sz="1785"/>
             </a:lvl5pPr>
             <a:lvl6pPr>
-              <a:defRPr sz="1890"/>
+              <a:defRPr sz="1785"/>
             </a:lvl6pPr>
             <a:lvl7pPr>
-              <a:defRPr sz="1890"/>
+              <a:defRPr sz="1785"/>
             </a:lvl7pPr>
             <a:lvl8pPr>
-              <a:defRPr sz="1890"/>
+              <a:defRPr sz="1785"/>
             </a:lvl8pPr>
             <a:lvl9pPr>
-              <a:defRPr sz="1890"/>
+              <a:defRPr sz="1785"/>
             </a:lvl9pPr>
           </a:lstStyle>
           <a:p>
@@ -2465,8 +2021,8 @@
         </p:nvSpPr>
         <p:spPr>
           <a:xfrm>
-            <a:off x="595178" y="2159794"/>
-            <a:ext cx="2786871" cy="4001285"/>
+            <a:off x="595178" y="1835944"/>
+            <a:ext cx="2786871" cy="3401313"/>
           </a:xfrm>
         </p:spPr>
         <p:txBody>
@@ -2474,39 +2030,39 @@
           <a:lstStyle>
             <a:lvl1pPr marL="0" indent="0">
               <a:buNone/>
-              <a:defRPr sz="1512"/>
+              <a:defRPr sz="1428"/>
             </a:lvl1pPr>
-            <a:lvl2pPr marL="432054" indent="0">
-              <a:buNone/>
-              <a:defRPr sz="1323"/>
+            <a:lvl2pPr marL="408005" indent="0">
+              <a:buNone/>
+              <a:defRPr sz="1249"/>
             </a:lvl2pPr>
-            <a:lvl3pPr marL="864108" indent="0">
-              <a:buNone/>
-              <a:defRPr sz="1134"/>
+            <a:lvl3pPr marL="816011" indent="0">
+              <a:buNone/>
+              <a:defRPr sz="1071"/>
             </a:lvl3pPr>
-            <a:lvl4pPr marL="1296162" indent="0">
-              <a:buNone/>
-              <a:defRPr sz="945"/>
+            <a:lvl4pPr marL="1224016" indent="0">
+              <a:buNone/>
+              <a:defRPr sz="892"/>
             </a:lvl4pPr>
-            <a:lvl5pPr marL="1728216" indent="0">
-              <a:buNone/>
-              <a:defRPr sz="945"/>
+            <a:lvl5pPr marL="1632021" indent="0">
+              <a:buNone/>
+              <a:defRPr sz="892"/>
             </a:lvl5pPr>
-            <a:lvl6pPr marL="2160270" indent="0">
-              <a:buNone/>
-              <a:defRPr sz="945"/>
+            <a:lvl6pPr marL="2040026" indent="0">
+              <a:buNone/>
+              <a:defRPr sz="892"/>
             </a:lvl6pPr>
-            <a:lvl7pPr marL="2592324" indent="0">
-              <a:buNone/>
-              <a:defRPr sz="945"/>
+            <a:lvl7pPr marL="2448032" indent="0">
+              <a:buNone/>
+              <a:defRPr sz="892"/>
             </a:lvl7pPr>
-            <a:lvl8pPr marL="3024378" indent="0">
-              <a:buNone/>
-              <a:defRPr sz="945"/>
+            <a:lvl8pPr marL="2856037" indent="0">
+              <a:buNone/>
+              <a:defRPr sz="892"/>
             </a:lvl8pPr>
-            <a:lvl9pPr marL="3456432" indent="0">
-              <a:buNone/>
-              <a:defRPr sz="945"/>
+            <a:lvl9pPr marL="3264042" indent="0">
+              <a:buNone/>
+              <a:defRPr sz="892"/>
             </a:lvl9pPr>
           </a:lstStyle>
           <a:p>
@@ -2533,9 +2089,9 @@
           <a:bodyPr/>
           <a:lstStyle/>
           <a:p>
-            <a:fld id="{CD0E8049-E101-1D4D-AC32-01FB6D0C811C}" type="datetimeFigureOut">
+            <a:fld id="{B681DD06-4446-3540-B2FF-84F971E3DC52}" type="datetimeFigureOut">
               <a:rPr lang="en-GB" smtClean="0"/>
-              <a:t>07/07/2024</a:t>
+              <a:t>29/10/2024</a:t>
             </a:fld>
             <a:endParaRPr lang="en-GB"/>
           </a:p>
@@ -2575,7 +2131,7 @@
           <a:bodyPr/>
           <a:lstStyle/>
           <a:p>
-            <a:fld id="{4EE1162B-F7B0-CE4A-9E53-09DAE08FBC24}" type="slidenum">
+            <a:fld id="{EECF5340-C9EA-3B4C-9024-1A3D501BE071}" type="slidenum">
               <a:rPr lang="en-GB" smtClean="0"/>
               <a:t>‹#›</a:t>
             </a:fld>
@@ -2586,7 +2142,7 @@
     </p:spTree>
     <p:extLst>
       <p:ext uri="{BB962C8B-B14F-4D97-AF65-F5344CB8AC3E}">
-        <p14:creationId xmlns:p14="http://schemas.microsoft.com/office/powerpoint/2010/main" val="2812094247"/>
+        <p14:creationId xmlns:p14="http://schemas.microsoft.com/office/powerpoint/2010/main" val="3480519994"/>
       </p:ext>
     </p:extLst>
   </p:cSld>
@@ -2625,15 +2181,15 @@
         </p:nvSpPr>
         <p:spPr>
           <a:xfrm>
-            <a:off x="595178" y="479954"/>
-            <a:ext cx="2786871" cy="1679840"/>
+            <a:off x="595178" y="407988"/>
+            <a:ext cx="2786871" cy="1427956"/>
           </a:xfrm>
         </p:spPr>
         <p:txBody>
           <a:bodyPr anchor="b"/>
           <a:lstStyle>
             <a:lvl1pPr>
-              <a:defRPr sz="3024"/>
+              <a:defRPr sz="2856"/>
             </a:lvl1pPr>
           </a:lstStyle>
           <a:p>
@@ -2657,8 +2213,8 @@
         </p:nvSpPr>
         <p:spPr>
           <a:xfrm>
-            <a:off x="3673450" y="1036570"/>
-            <a:ext cx="4374386" cy="5116178"/>
+            <a:off x="3673450" y="881141"/>
+            <a:ext cx="4374386" cy="4349034"/>
           </a:xfrm>
         </p:spPr>
         <p:txBody>
@@ -2666,39 +2222,39 @@
           <a:lstStyle>
             <a:lvl1pPr marL="0" indent="0">
               <a:buNone/>
-              <a:defRPr sz="3024"/>
+              <a:defRPr sz="2856"/>
             </a:lvl1pPr>
-            <a:lvl2pPr marL="432054" indent="0">
-              <a:buNone/>
-              <a:defRPr sz="2646"/>
+            <a:lvl2pPr marL="408005" indent="0">
+              <a:buNone/>
+              <a:defRPr sz="2499"/>
             </a:lvl2pPr>
-            <a:lvl3pPr marL="864108" indent="0">
-              <a:buNone/>
-              <a:defRPr sz="2268"/>
+            <a:lvl3pPr marL="816011" indent="0">
+              <a:buNone/>
+              <a:defRPr sz="2142"/>
             </a:lvl3pPr>
-            <a:lvl4pPr marL="1296162" indent="0">
-              <a:buNone/>
-              <a:defRPr sz="1890"/>
+            <a:lvl4pPr marL="1224016" indent="0">
+              <a:buNone/>
+              <a:defRPr sz="1785"/>
             </a:lvl4pPr>
-            <a:lvl5pPr marL="1728216" indent="0">
-              <a:buNone/>
-              <a:defRPr sz="1890"/>
+            <a:lvl5pPr marL="1632021" indent="0">
+              <a:buNone/>
+              <a:defRPr sz="1785"/>
             </a:lvl5pPr>
-            <a:lvl6pPr marL="2160270" indent="0">
-              <a:buNone/>
-              <a:defRPr sz="1890"/>
+            <a:lvl6pPr marL="2040026" indent="0">
+              <a:buNone/>
+              <a:defRPr sz="1785"/>
             </a:lvl6pPr>
-            <a:lvl7pPr marL="2592324" indent="0">
-              <a:buNone/>
-              <a:defRPr sz="1890"/>
+            <a:lvl7pPr marL="2448032" indent="0">
+              <a:buNone/>
+              <a:defRPr sz="1785"/>
             </a:lvl7pPr>
-            <a:lvl8pPr marL="3024378" indent="0">
-              <a:buNone/>
-              <a:defRPr sz="1890"/>
+            <a:lvl8pPr marL="2856037" indent="0">
+              <a:buNone/>
+              <a:defRPr sz="1785"/>
             </a:lvl8pPr>
-            <a:lvl9pPr marL="3456432" indent="0">
-              <a:buNone/>
-              <a:defRPr sz="1890"/>
+            <a:lvl9pPr marL="3264042" indent="0">
+              <a:buNone/>
+              <a:defRPr sz="1785"/>
             </a:lvl9pPr>
           </a:lstStyle>
           <a:p>
@@ -2722,8 +2278,8 @@
         </p:nvSpPr>
         <p:spPr>
           <a:xfrm>
-            <a:off x="595178" y="2159794"/>
-            <a:ext cx="2786871" cy="4001285"/>
+            <a:off x="595178" y="1835944"/>
+            <a:ext cx="2786871" cy="3401313"/>
           </a:xfrm>
         </p:spPr>
         <p:txBody>
@@ -2731,39 +2287,39 @@
           <a:lstStyle>
             <a:lvl1pPr marL="0" indent="0">
               <a:buNone/>
-              <a:defRPr sz="1512"/>
+              <a:defRPr sz="1428"/>
             </a:lvl1pPr>
-            <a:lvl2pPr marL="432054" indent="0">
-              <a:buNone/>
-              <a:defRPr sz="1323"/>
+            <a:lvl2pPr marL="408005" indent="0">
+              <a:buNone/>
+              <a:defRPr sz="1249"/>
             </a:lvl2pPr>
-            <a:lvl3pPr marL="864108" indent="0">
-              <a:buNone/>
-              <a:defRPr sz="1134"/>
+            <a:lvl3pPr marL="816011" indent="0">
+              <a:buNone/>
+              <a:defRPr sz="1071"/>
             </a:lvl3pPr>
-            <a:lvl4pPr marL="1296162" indent="0">
-              <a:buNone/>
-              <a:defRPr sz="945"/>
+            <a:lvl4pPr marL="1224016" indent="0">
+              <a:buNone/>
+              <a:defRPr sz="892"/>
             </a:lvl4pPr>
-            <a:lvl5pPr marL="1728216" indent="0">
-              <a:buNone/>
-              <a:defRPr sz="945"/>
+            <a:lvl5pPr marL="1632021" indent="0">
+              <a:buNone/>
+              <a:defRPr sz="892"/>
             </a:lvl5pPr>
-            <a:lvl6pPr marL="2160270" indent="0">
-              <a:buNone/>
-              <a:defRPr sz="945"/>
+            <a:lvl6pPr marL="2040026" indent="0">
+              <a:buNone/>
+              <a:defRPr sz="892"/>
             </a:lvl6pPr>
-            <a:lvl7pPr marL="2592324" indent="0">
-              <a:buNone/>
-              <a:defRPr sz="945"/>
+            <a:lvl7pPr marL="2448032" indent="0">
+              <a:buNone/>
+              <a:defRPr sz="892"/>
             </a:lvl7pPr>
-            <a:lvl8pPr marL="3024378" indent="0">
-              <a:buNone/>
-              <a:defRPr sz="945"/>
+            <a:lvl8pPr marL="2856037" indent="0">
+              <a:buNone/>
+              <a:defRPr sz="892"/>
             </a:lvl8pPr>
-            <a:lvl9pPr marL="3456432" indent="0">
-              <a:buNone/>
-              <a:defRPr sz="945"/>
+            <a:lvl9pPr marL="3264042" indent="0">
+              <a:buNone/>
+              <a:defRPr sz="892"/>
             </a:lvl9pPr>
           </a:lstStyle>
           <a:p>
@@ -2790,9 +2346,9 @@
           <a:bodyPr/>
           <a:lstStyle/>
           <a:p>
-            <a:fld id="{CD0E8049-E101-1D4D-AC32-01FB6D0C811C}" type="datetimeFigureOut">
+            <a:fld id="{B681DD06-4446-3540-B2FF-84F971E3DC52}" type="datetimeFigureOut">
               <a:rPr lang="en-GB" smtClean="0"/>
-              <a:t>07/07/2024</a:t>
+              <a:t>29/10/2024</a:t>
             </a:fld>
             <a:endParaRPr lang="en-GB"/>
           </a:p>
@@ -2832,7 +2388,7 @@
           <a:bodyPr/>
           <a:lstStyle/>
           <a:p>
-            <a:fld id="{4EE1162B-F7B0-CE4A-9E53-09DAE08FBC24}" type="slidenum">
+            <a:fld id="{EECF5340-C9EA-3B4C-9024-1A3D501BE071}" type="slidenum">
               <a:rPr lang="en-GB" smtClean="0"/>
               <a:t>‹#›</a:t>
             </a:fld>
@@ -2843,7 +2399,7 @@
     </p:spTree>
     <p:extLst>
       <p:ext uri="{BB962C8B-B14F-4D97-AF65-F5344CB8AC3E}">
-        <p14:creationId xmlns:p14="http://schemas.microsoft.com/office/powerpoint/2010/main" val="2257140320"/>
+        <p14:creationId xmlns:p14="http://schemas.microsoft.com/office/powerpoint/2010/main" val="4237766682"/>
       </p:ext>
     </p:extLst>
   </p:cSld>
@@ -2887,8 +2443,8 @@
         </p:nvSpPr>
         <p:spPr>
           <a:xfrm>
-            <a:off x="594053" y="383299"/>
-            <a:ext cx="7452658" cy="1391534"/>
+            <a:off x="594053" y="325825"/>
+            <a:ext cx="7452658" cy="1182881"/>
           </a:xfrm>
           <a:prstGeom prst="rect">
             <a:avLst/>
@@ -2920,8 +2476,8 @@
         </p:nvSpPr>
         <p:spPr>
           <a:xfrm>
-            <a:off x="594053" y="1916484"/>
-            <a:ext cx="7452658" cy="4567898"/>
+            <a:off x="594053" y="1629117"/>
+            <a:ext cx="7452658" cy="3882965"/>
           </a:xfrm>
           <a:prstGeom prst="rect">
             <a:avLst/>
@@ -2982,8 +2538,8 @@
         </p:nvSpPr>
         <p:spPr>
           <a:xfrm>
-            <a:off x="594052" y="6672698"/>
-            <a:ext cx="1944172" cy="383297"/>
+            <a:off x="594052" y="5672162"/>
+            <a:ext cx="1944172" cy="325823"/>
           </a:xfrm>
           <a:prstGeom prst="rect">
             <a:avLst/>
@@ -2993,7 +2549,7 @@
           <a:bodyPr vert="horz" lIns="91440" tIns="45720" rIns="91440" bIns="45720" rtlCol="0" anchor="ctr"/>
           <a:lstStyle>
             <a:lvl1pPr algn="l">
-              <a:defRPr sz="1134">
+              <a:defRPr sz="1071">
                 <a:solidFill>
                   <a:schemeClr val="tx1">
                     <a:tint val="75000"/>
@@ -3003,9 +2559,9 @@
             </a:lvl1pPr>
           </a:lstStyle>
           <a:p>
-            <a:fld id="{CD0E8049-E101-1D4D-AC32-01FB6D0C811C}" type="datetimeFigureOut">
+            <a:fld id="{B681DD06-4446-3540-B2FF-84F971E3DC52}" type="datetimeFigureOut">
               <a:rPr lang="en-GB" smtClean="0"/>
-              <a:t>07/07/2024</a:t>
+              <a:t>29/10/2024</a:t>
             </a:fld>
             <a:endParaRPr lang="en-GB"/>
           </a:p>
@@ -3023,8 +2579,8 @@
         </p:nvSpPr>
         <p:spPr>
           <a:xfrm>
-            <a:off x="2862253" y="6672698"/>
-            <a:ext cx="2916258" cy="383297"/>
+            <a:off x="2862253" y="5672162"/>
+            <a:ext cx="2916258" cy="325823"/>
           </a:xfrm>
           <a:prstGeom prst="rect">
             <a:avLst/>
@@ -3034,7 +2590,7 @@
           <a:bodyPr vert="horz" lIns="91440" tIns="45720" rIns="91440" bIns="45720" rtlCol="0" anchor="ctr"/>
           <a:lstStyle>
             <a:lvl1pPr algn="ctr">
-              <a:defRPr sz="1134">
+              <a:defRPr sz="1071">
                 <a:solidFill>
                   <a:schemeClr val="tx1">
                     <a:tint val="75000"/>
@@ -3060,8 +2616,8 @@
         </p:nvSpPr>
         <p:spPr>
           <a:xfrm>
-            <a:off x="6102539" y="6672698"/>
-            <a:ext cx="1944172" cy="383297"/>
+            <a:off x="6102539" y="5672162"/>
+            <a:ext cx="1944172" cy="325823"/>
           </a:xfrm>
           <a:prstGeom prst="rect">
             <a:avLst/>
@@ -3071,7 +2627,7 @@
           <a:bodyPr vert="horz" lIns="91440" tIns="45720" rIns="91440" bIns="45720" rtlCol="0" anchor="ctr"/>
           <a:lstStyle>
             <a:lvl1pPr algn="r">
-              <a:defRPr sz="1134">
+              <a:defRPr sz="1071">
                 <a:solidFill>
                   <a:schemeClr val="tx1">
                     <a:tint val="75000"/>
@@ -3081,7 +2637,7 @@
             </a:lvl1pPr>
           </a:lstStyle>
           <a:p>
-            <a:fld id="{4EE1162B-F7B0-CE4A-9E53-09DAE08FBC24}" type="slidenum">
+            <a:fld id="{EECF5340-C9EA-3B4C-9024-1A3D501BE071}" type="slidenum">
               <a:rPr lang="en-GB" smtClean="0"/>
               <a:t>‹#›</a:t>
             </a:fld>
@@ -3092,7 +2648,7 @@
     </p:spTree>
     <p:extLst>
       <p:ext uri="{BB962C8B-B14F-4D97-AF65-F5344CB8AC3E}">
-        <p14:creationId xmlns:p14="http://schemas.microsoft.com/office/powerpoint/2010/main" val="839082939"/>
+        <p14:creationId xmlns:p14="http://schemas.microsoft.com/office/powerpoint/2010/main" val="54761186"/>
       </p:ext>
     </p:extLst>
   </p:cSld>
@@ -3112,7 +2668,7 @@
   </p:sldLayoutIdLst>
   <p:txStyles>
     <p:titleStyle>
-      <a:lvl1pPr algn="l" defTabSz="864108" rtl="0" eaLnBrk="1" latinLnBrk="0" hangingPunct="1">
+      <a:lvl1pPr algn="l" defTabSz="816011" rtl="0" eaLnBrk="1" latinLnBrk="0" hangingPunct="1">
         <a:lnSpc>
           <a:spcPct val="90000"/>
         </a:lnSpc>
@@ -3120,7 +2676,7 @@
           <a:spcPct val="0"/>
         </a:spcBef>
         <a:buNone/>
-        <a:defRPr sz="4158" kern="1200">
+        <a:defRPr sz="3927" kern="1200">
           <a:solidFill>
             <a:schemeClr val="tx1"/>
           </a:solidFill>
@@ -3131,16 +2687,16 @@
       </a:lvl1pPr>
     </p:titleStyle>
     <p:bodyStyle>
-      <a:lvl1pPr marL="216027" indent="-216027" algn="l" defTabSz="864108" rtl="0" eaLnBrk="1" latinLnBrk="0" hangingPunct="1">
+      <a:lvl1pPr marL="204003" indent="-204003" algn="l" defTabSz="816011" rtl="0" eaLnBrk="1" latinLnBrk="0" hangingPunct="1">
         <a:lnSpc>
           <a:spcPct val="90000"/>
         </a:lnSpc>
         <a:spcBef>
-          <a:spcPts val="945"/>
+          <a:spcPts val="892"/>
         </a:spcBef>
         <a:buFont typeface="Arial" panose="020B0604020202020204" pitchFamily="34" charset="0"/>
         <a:buChar char="•"/>
-        <a:defRPr sz="2646" kern="1200">
+        <a:defRPr sz="2499" kern="1200">
           <a:solidFill>
             <a:schemeClr val="tx1"/>
           </a:solidFill>
@@ -3149,16 +2705,16 @@
           <a:cs typeface="+mn-cs"/>
         </a:defRPr>
       </a:lvl1pPr>
-      <a:lvl2pPr marL="648081" indent="-216027" algn="l" defTabSz="864108" rtl="0" eaLnBrk="1" latinLnBrk="0" hangingPunct="1">
+      <a:lvl2pPr marL="612008" indent="-204003" algn="l" defTabSz="816011" rtl="0" eaLnBrk="1" latinLnBrk="0" hangingPunct="1">
         <a:lnSpc>
           <a:spcPct val="90000"/>
         </a:lnSpc>
         <a:spcBef>
-          <a:spcPts val="472"/>
+          <a:spcPts val="446"/>
         </a:spcBef>
         <a:buFont typeface="Arial" panose="020B0604020202020204" pitchFamily="34" charset="0"/>
         <a:buChar char="•"/>
-        <a:defRPr sz="2268" kern="1200">
+        <a:defRPr sz="2142" kern="1200">
           <a:solidFill>
             <a:schemeClr val="tx1"/>
           </a:solidFill>
@@ -3167,16 +2723,16 @@
           <a:cs typeface="+mn-cs"/>
         </a:defRPr>
       </a:lvl2pPr>
-      <a:lvl3pPr marL="1080135" indent="-216027" algn="l" defTabSz="864108" rtl="0" eaLnBrk="1" latinLnBrk="0" hangingPunct="1">
+      <a:lvl3pPr marL="1020013" indent="-204003" algn="l" defTabSz="816011" rtl="0" eaLnBrk="1" latinLnBrk="0" hangingPunct="1">
         <a:lnSpc>
           <a:spcPct val="90000"/>
         </a:lnSpc>
         <a:spcBef>
-          <a:spcPts val="472"/>
+          <a:spcPts val="446"/>
         </a:spcBef>
         <a:buFont typeface="Arial" panose="020B0604020202020204" pitchFamily="34" charset="0"/>
         <a:buChar char="•"/>
-        <a:defRPr sz="1890" kern="1200">
+        <a:defRPr sz="1785" kern="1200">
           <a:solidFill>
             <a:schemeClr val="tx1"/>
           </a:solidFill>
@@ -3185,16 +2741,16 @@
           <a:cs typeface="+mn-cs"/>
         </a:defRPr>
       </a:lvl3pPr>
-      <a:lvl4pPr marL="1512189" indent="-216027" algn="l" defTabSz="864108" rtl="0" eaLnBrk="1" latinLnBrk="0" hangingPunct="1">
+      <a:lvl4pPr marL="1428018" indent="-204003" algn="l" defTabSz="816011" rtl="0" eaLnBrk="1" latinLnBrk="0" hangingPunct="1">
         <a:lnSpc>
           <a:spcPct val="90000"/>
         </a:lnSpc>
         <a:spcBef>
-          <a:spcPts val="472"/>
+          <a:spcPts val="446"/>
         </a:spcBef>
         <a:buFont typeface="Arial" panose="020B0604020202020204" pitchFamily="34" charset="0"/>
         <a:buChar char="•"/>
-        <a:defRPr sz="1701" kern="1200">
+        <a:defRPr sz="1606" kern="1200">
           <a:solidFill>
             <a:schemeClr val="tx1"/>
           </a:solidFill>
@@ -3203,16 +2759,16 @@
           <a:cs typeface="+mn-cs"/>
         </a:defRPr>
       </a:lvl4pPr>
-      <a:lvl5pPr marL="1944243" indent="-216027" algn="l" defTabSz="864108" rtl="0" eaLnBrk="1" latinLnBrk="0" hangingPunct="1">
+      <a:lvl5pPr marL="1836024" indent="-204003" algn="l" defTabSz="816011" rtl="0" eaLnBrk="1" latinLnBrk="0" hangingPunct="1">
         <a:lnSpc>
           <a:spcPct val="90000"/>
         </a:lnSpc>
         <a:spcBef>
-          <a:spcPts val="472"/>
+          <a:spcPts val="446"/>
         </a:spcBef>
         <a:buFont typeface="Arial" panose="020B0604020202020204" pitchFamily="34" charset="0"/>
         <a:buChar char="•"/>
-        <a:defRPr sz="1701" kern="1200">
+        <a:defRPr sz="1606" kern="1200">
           <a:solidFill>
             <a:schemeClr val="tx1"/>
           </a:solidFill>
@@ -3221,16 +2777,16 @@
           <a:cs typeface="+mn-cs"/>
         </a:defRPr>
       </a:lvl5pPr>
-      <a:lvl6pPr marL="2376297" indent="-216027" algn="l" defTabSz="864108" rtl="0" eaLnBrk="1" latinLnBrk="0" hangingPunct="1">
+      <a:lvl6pPr marL="2244029" indent="-204003" algn="l" defTabSz="816011" rtl="0" eaLnBrk="1" latinLnBrk="0" hangingPunct="1">
         <a:lnSpc>
           <a:spcPct val="90000"/>
         </a:lnSpc>
         <a:spcBef>
-          <a:spcPts val="472"/>
+          <a:spcPts val="446"/>
         </a:spcBef>
         <a:buFont typeface="Arial" panose="020B0604020202020204" pitchFamily="34" charset="0"/>
         <a:buChar char="•"/>
-        <a:defRPr sz="1701" kern="1200">
+        <a:defRPr sz="1606" kern="1200">
           <a:solidFill>
             <a:schemeClr val="tx1"/>
           </a:solidFill>
@@ -3239,16 +2795,16 @@
           <a:cs typeface="+mn-cs"/>
         </a:defRPr>
       </a:lvl6pPr>
-      <a:lvl7pPr marL="2808351" indent="-216027" algn="l" defTabSz="864108" rtl="0" eaLnBrk="1" latinLnBrk="0" hangingPunct="1">
+      <a:lvl7pPr marL="2652034" indent="-204003" algn="l" defTabSz="816011" rtl="0" eaLnBrk="1" latinLnBrk="0" hangingPunct="1">
         <a:lnSpc>
           <a:spcPct val="90000"/>
         </a:lnSpc>
         <a:spcBef>
-          <a:spcPts val="472"/>
+          <a:spcPts val="446"/>
         </a:spcBef>
         <a:buFont typeface="Arial" panose="020B0604020202020204" pitchFamily="34" charset="0"/>
         <a:buChar char="•"/>
-        <a:defRPr sz="1701" kern="1200">
+        <a:defRPr sz="1606" kern="1200">
           <a:solidFill>
             <a:schemeClr val="tx1"/>
           </a:solidFill>
@@ -3257,16 +2813,16 @@
           <a:cs typeface="+mn-cs"/>
         </a:defRPr>
       </a:lvl7pPr>
-      <a:lvl8pPr marL="3240405" indent="-216027" algn="l" defTabSz="864108" rtl="0" eaLnBrk="1" latinLnBrk="0" hangingPunct="1">
+      <a:lvl8pPr marL="3060040" indent="-204003" algn="l" defTabSz="816011" rtl="0" eaLnBrk="1" latinLnBrk="0" hangingPunct="1">
         <a:lnSpc>
           <a:spcPct val="90000"/>
         </a:lnSpc>
         <a:spcBef>
-          <a:spcPts val="472"/>
+          <a:spcPts val="446"/>
         </a:spcBef>
         <a:buFont typeface="Arial" panose="020B0604020202020204" pitchFamily="34" charset="0"/>
         <a:buChar char="•"/>
-        <a:defRPr sz="1701" kern="1200">
+        <a:defRPr sz="1606" kern="1200">
           <a:solidFill>
             <a:schemeClr val="tx1"/>
           </a:solidFill>
@@ -3275,16 +2831,16 @@
           <a:cs typeface="+mn-cs"/>
         </a:defRPr>
       </a:lvl8pPr>
-      <a:lvl9pPr marL="3672459" indent="-216027" algn="l" defTabSz="864108" rtl="0" eaLnBrk="1" latinLnBrk="0" hangingPunct="1">
+      <a:lvl9pPr marL="3468045" indent="-204003" algn="l" defTabSz="816011" rtl="0" eaLnBrk="1" latinLnBrk="0" hangingPunct="1">
         <a:lnSpc>
           <a:spcPct val="90000"/>
         </a:lnSpc>
         <a:spcBef>
-          <a:spcPts val="472"/>
+          <a:spcPts val="446"/>
         </a:spcBef>
         <a:buFont typeface="Arial" panose="020B0604020202020204" pitchFamily="34" charset="0"/>
         <a:buChar char="•"/>
-        <a:defRPr sz="1701" kern="1200">
+        <a:defRPr sz="1606" kern="1200">
           <a:solidFill>
             <a:schemeClr val="tx1"/>
           </a:solidFill>
@@ -3298,8 +2854,8 @@
       <a:defPPr>
         <a:defRPr lang="en-US"/>
       </a:defPPr>
-      <a:lvl1pPr marL="0" algn="l" defTabSz="864108" rtl="0" eaLnBrk="1" latinLnBrk="0" hangingPunct="1">
-        <a:defRPr sz="1701" kern="1200">
+      <a:lvl1pPr marL="0" algn="l" defTabSz="816011" rtl="0" eaLnBrk="1" latinLnBrk="0" hangingPunct="1">
+        <a:defRPr sz="1606" kern="1200">
           <a:solidFill>
             <a:schemeClr val="tx1"/>
           </a:solidFill>
@@ -3308,8 +2864,8 @@
           <a:cs typeface="+mn-cs"/>
         </a:defRPr>
       </a:lvl1pPr>
-      <a:lvl2pPr marL="432054" algn="l" defTabSz="864108" rtl="0" eaLnBrk="1" latinLnBrk="0" hangingPunct="1">
-        <a:defRPr sz="1701" kern="1200">
+      <a:lvl2pPr marL="408005" algn="l" defTabSz="816011" rtl="0" eaLnBrk="1" latinLnBrk="0" hangingPunct="1">
+        <a:defRPr sz="1606" kern="1200">
           <a:solidFill>
             <a:schemeClr val="tx1"/>
           </a:solidFill>
@@ -3318,8 +2874,8 @@
           <a:cs typeface="+mn-cs"/>
         </a:defRPr>
       </a:lvl2pPr>
-      <a:lvl3pPr marL="864108" algn="l" defTabSz="864108" rtl="0" eaLnBrk="1" latinLnBrk="0" hangingPunct="1">
-        <a:defRPr sz="1701" kern="1200">
+      <a:lvl3pPr marL="816011" algn="l" defTabSz="816011" rtl="0" eaLnBrk="1" latinLnBrk="0" hangingPunct="1">
+        <a:defRPr sz="1606" kern="1200">
           <a:solidFill>
             <a:schemeClr val="tx1"/>
           </a:solidFill>
@@ -3328,8 +2884,8 @@
           <a:cs typeface="+mn-cs"/>
         </a:defRPr>
       </a:lvl3pPr>
-      <a:lvl4pPr marL="1296162" algn="l" defTabSz="864108" rtl="0" eaLnBrk="1" latinLnBrk="0" hangingPunct="1">
-        <a:defRPr sz="1701" kern="1200">
+      <a:lvl4pPr marL="1224016" algn="l" defTabSz="816011" rtl="0" eaLnBrk="1" latinLnBrk="0" hangingPunct="1">
+        <a:defRPr sz="1606" kern="1200">
           <a:solidFill>
             <a:schemeClr val="tx1"/>
           </a:solidFill>
@@ -3338,8 +2894,8 @@
           <a:cs typeface="+mn-cs"/>
         </a:defRPr>
       </a:lvl4pPr>
-      <a:lvl5pPr marL="1728216" algn="l" defTabSz="864108" rtl="0" eaLnBrk="1" latinLnBrk="0" hangingPunct="1">
-        <a:defRPr sz="1701" kern="1200">
+      <a:lvl5pPr marL="1632021" algn="l" defTabSz="816011" rtl="0" eaLnBrk="1" latinLnBrk="0" hangingPunct="1">
+        <a:defRPr sz="1606" kern="1200">
           <a:solidFill>
             <a:schemeClr val="tx1"/>
           </a:solidFill>
@@ -3348,8 +2904,8 @@
           <a:cs typeface="+mn-cs"/>
         </a:defRPr>
       </a:lvl5pPr>
-      <a:lvl6pPr marL="2160270" algn="l" defTabSz="864108" rtl="0" eaLnBrk="1" latinLnBrk="0" hangingPunct="1">
-        <a:defRPr sz="1701" kern="1200">
+      <a:lvl6pPr marL="2040026" algn="l" defTabSz="816011" rtl="0" eaLnBrk="1" latinLnBrk="0" hangingPunct="1">
+        <a:defRPr sz="1606" kern="1200">
           <a:solidFill>
             <a:schemeClr val="tx1"/>
           </a:solidFill>
@@ -3358,8 +2914,8 @@
           <a:cs typeface="+mn-cs"/>
         </a:defRPr>
       </a:lvl6pPr>
-      <a:lvl7pPr marL="2592324" algn="l" defTabSz="864108" rtl="0" eaLnBrk="1" latinLnBrk="0" hangingPunct="1">
-        <a:defRPr sz="1701" kern="1200">
+      <a:lvl7pPr marL="2448032" algn="l" defTabSz="816011" rtl="0" eaLnBrk="1" latinLnBrk="0" hangingPunct="1">
+        <a:defRPr sz="1606" kern="1200">
           <a:solidFill>
             <a:schemeClr val="tx1"/>
           </a:solidFill>
@@ -3368,8 +2924,8 @@
           <a:cs typeface="+mn-cs"/>
         </a:defRPr>
       </a:lvl7pPr>
-      <a:lvl8pPr marL="3024378" algn="l" defTabSz="864108" rtl="0" eaLnBrk="1" latinLnBrk="0" hangingPunct="1">
-        <a:defRPr sz="1701" kern="1200">
+      <a:lvl8pPr marL="2856037" algn="l" defTabSz="816011" rtl="0" eaLnBrk="1" latinLnBrk="0" hangingPunct="1">
+        <a:defRPr sz="1606" kern="1200">
           <a:solidFill>
             <a:schemeClr val="tx1"/>
           </a:solidFill>
@@ -3378,8 +2934,8 @@
           <a:cs typeface="+mn-cs"/>
         </a:defRPr>
       </a:lvl8pPr>
-      <a:lvl9pPr marL="3456432" algn="l" defTabSz="864108" rtl="0" eaLnBrk="1" latinLnBrk="0" hangingPunct="1">
-        <a:defRPr sz="1701" kern="1200">
+      <a:lvl9pPr marL="3264042" algn="l" defTabSz="816011" rtl="0" eaLnBrk="1" latinLnBrk="0" hangingPunct="1">
+        <a:defRPr sz="1606" kern="1200">
           <a:solidFill>
             <a:schemeClr val="tx1"/>
           </a:solidFill>
@@ -3410,49 +2966,14 @@
           <a:chExt cx="0" cy="0"/>
         </a:xfrm>
       </p:grpSpPr>
-      <p:sp>
-        <p:nvSpPr>
-          <p:cNvPr id="9" name="Title 8">
-            <a:extLst>
-              <a:ext uri="{FF2B5EF4-FFF2-40B4-BE49-F238E27FC236}">
-                <a16:creationId xmlns:a16="http://schemas.microsoft.com/office/drawing/2014/main" id="{FCC25724-2B6A-2F4F-AB8F-9F49E79127E1}"/>
-              </a:ext>
-            </a:extLst>
-          </p:cNvPr>
-          <p:cNvSpPr>
-            <a:spLocks noGrp="1"/>
-          </p:cNvSpPr>
-          <p:nvPr>
-            <p:ph type="title"/>
-          </p:nvPr>
-        </p:nvSpPr>
-        <p:spPr>
-          <a:xfrm>
-            <a:off x="594053" y="-602353"/>
-            <a:ext cx="7452658" cy="424223"/>
-          </a:xfrm>
-        </p:spPr>
-        <p:txBody>
-          <a:bodyPr>
-            <a:normAutofit/>
-          </a:bodyPr>
-          <a:lstStyle/>
-          <a:p>
-            <a:r>
-              <a:rPr lang="en-GB" sz="2000" dirty="0"/>
-              <a:t>Pythagoras Tree Attractor</a:t>
-            </a:r>
-          </a:p>
-        </p:txBody>
-      </p:sp>
       <mc:AlternateContent xmlns:mc="http://schemas.openxmlformats.org/markup-compatibility/2006">
         <mc:Choice xmlns:pslz="http://schemas.microsoft.com/office/powerpoint/2016/slidezoom" Requires="pslz">
           <p:graphicFrame>
             <p:nvGraphicFramePr>
-              <p:cNvPr id="13" name="Slide Zoom 12">
+              <p:cNvPr id="6" name="Slide Zoom 5">
                 <a:extLst>
                   <a:ext uri="{FF2B5EF4-FFF2-40B4-BE49-F238E27FC236}">
-                    <a16:creationId xmlns:a16="http://schemas.microsoft.com/office/drawing/2014/main" id="{9A007BED-ED26-4646-94FA-89AAC9961004}"/>
+                    <a16:creationId xmlns:a16="http://schemas.microsoft.com/office/drawing/2014/main" id="{BFB0204A-9CCD-5CB6-5D4C-52B7339B67E7}"/>
                   </a:ext>
                 </a:extLst>
               </p:cNvPr>
@@ -3462,30 +2983,30 @@
               <p:nvPr>
                 <p:extLst>
                   <p:ext uri="{D42A27DB-BD31-4B8C-83A1-F6EECF244321}">
-                    <p14:modId xmlns:p14="http://schemas.microsoft.com/office/powerpoint/2010/main" val="1651070234"/>
+                    <p14:modId xmlns:p14="http://schemas.microsoft.com/office/powerpoint/2010/main" val="2591422427"/>
                   </p:ext>
                 </p:extLst>
               </p:nvPr>
             </p:nvGraphicFramePr>
-            <p:xfrm rot="19380000">
-              <a:off x="-353574" y="360000"/>
-              <a:ext cx="6912000" cy="5758940"/>
+            <p:xfrm rot="19387800">
+              <a:off x="-482817" y="327710"/>
+              <a:ext cx="6912000" cy="4895417"/>
             </p:xfrm>
             <a:graphic>
               <a:graphicData uri="http://schemas.microsoft.com/office/powerpoint/2016/slidezoom">
                 <pslz:sldZm>
-                  <pslz:sldZmObj sldId="320" cId="1580736921">
-                    <pslz:zmPr id="{BAD9A189-B5D3-804A-B3FE-4036F0C4A67D}" returnToParent="0" transitionDur="1000" showBg="0">
+                  <pslz:sldZmObj sldId="256" cId="2380184264">
+                    <pslz:zmPr id="{6184D655-31FA-EE49-9346-54B10FA4F9C1}" returnToParent="0" transitionDur="1000" showBg="0">
                       <p166:blipFill xmlns:p166="http://schemas.microsoft.com/office/powerpoint/2016/6/main">
-                        <a:blip r:embed="rId3"/>
+                        <a:blip r:embed="rId2"/>
                         <a:stretch>
                           <a:fillRect/>
                         </a:stretch>
                       </p166:blipFill>
                       <p166:spPr xmlns:p166="http://schemas.microsoft.com/office/powerpoint/2016/6/main">
-                        <a:xfrm rot="19380000">
+                        <a:xfrm rot="19387800">
                           <a:off x="0" y="0"/>
-                          <a:ext cx="6912000" cy="5758940"/>
+                          <a:ext cx="6912000" cy="4895417"/>
                         </a:xfrm>
                         <a:prstGeom prst="rect">
                           <a:avLst/>
@@ -3501,11 +3022,11 @@
         <mc:Fallback>
           <p:pic>
             <p:nvPicPr>
-              <p:cNvPr id="13" name="Slide Zoom 12">
-                <a:hlinkClick r:id="rId4" action="ppaction://hlinksldjump"/>
+              <p:cNvPr id="6" name="Slide Zoom 5">
+                <a:hlinkClick r:id="rId3" action="ppaction://hlinksldjump"/>
                 <a:extLst>
                   <a:ext uri="{FF2B5EF4-FFF2-40B4-BE49-F238E27FC236}">
-                    <a16:creationId xmlns:a16="http://schemas.microsoft.com/office/drawing/2014/main" id="{9A007BED-ED26-4646-94FA-89AAC9961004}"/>
+                    <a16:creationId xmlns:a16="http://schemas.microsoft.com/office/drawing/2014/main" id="{BFB0204A-9CCD-5CB6-5D4C-52B7339B67E7}"/>
                   </a:ext>
                 </a:extLst>
               </p:cNvPr>
@@ -3515,15 +3036,15 @@
               <p:nvPr/>
             </p:nvPicPr>
             <p:blipFill>
-              <a:blip r:embed="rId3"/>
+              <a:blip r:embed="rId2"/>
               <a:stretch>
                 <a:fillRect/>
               </a:stretch>
             </p:blipFill>
             <p:spPr>
-              <a:xfrm rot="19380000">
-                <a:off x="-353574" y="360000"/>
-                <a:ext cx="6912000" cy="5758940"/>
+              <a:xfrm rot="19387800">
+                <a:off x="-482817" y="327710"/>
+                <a:ext cx="6912000" cy="4895417"/>
               </a:xfrm>
               <a:prstGeom prst="rect">
                 <a:avLst/>
@@ -3536,10 +3057,10 @@
         <mc:Choice xmlns:pslz="http://schemas.microsoft.com/office/powerpoint/2016/slidezoom" Requires="pslz">
           <p:graphicFrame>
             <p:nvGraphicFramePr>
-              <p:cNvPr id="15" name="Slide Zoom 14">
+              <p:cNvPr id="7" name="Slide Zoom 6">
                 <a:extLst>
                   <a:ext uri="{FF2B5EF4-FFF2-40B4-BE49-F238E27FC236}">
-                    <a16:creationId xmlns:a16="http://schemas.microsoft.com/office/drawing/2014/main" id="{FA9BA35C-31A3-EF4E-B159-18655325BB74}"/>
+                    <a16:creationId xmlns:a16="http://schemas.microsoft.com/office/drawing/2014/main" id="{70E2BE6A-C80D-1B7A-F591-4456276E64EF}"/>
                   </a:ext>
                 </a:extLst>
               </p:cNvPr>
@@ -3549,30 +3070,30 @@
               <p:nvPr>
                 <p:extLst>
                   <p:ext uri="{D42A27DB-BD31-4B8C-83A1-F6EECF244321}">
-                    <p14:modId xmlns:p14="http://schemas.microsoft.com/office/powerpoint/2010/main" val="1793257231"/>
+                    <p14:modId xmlns:p14="http://schemas.microsoft.com/office/powerpoint/2010/main" val="1314421406"/>
                   </p:ext>
                 </p:extLst>
               </p:nvPr>
             </p:nvGraphicFramePr>
-            <p:xfrm rot="3180000">
-              <a:off x="3715200" y="1170000"/>
-              <a:ext cx="5184000" cy="4319205"/>
+            <p:xfrm rot="3187800">
+              <a:off x="4009595" y="1022709"/>
+              <a:ext cx="5184000" cy="3671563"/>
             </p:xfrm>
             <a:graphic>
               <a:graphicData uri="http://schemas.microsoft.com/office/powerpoint/2016/slidezoom">
                 <pslz:sldZm>
-                  <pslz:sldZmObj sldId="320" cId="1580736921">
-                    <pslz:zmPr id="{BAD9A189-B5D3-804A-B3FE-4036F0C4A67D}" returnToParent="0" transitionDur="1000" showBg="0">
+                  <pslz:sldZmObj sldId="256" cId="2380184264">
+                    <pslz:zmPr id="{6184D655-31FA-EE49-9346-54B10FA4F9C1}" returnToParent="0" transitionDur="1000" showBg="0">
                       <p166:blipFill xmlns:p166="http://schemas.microsoft.com/office/powerpoint/2016/6/main">
-                        <a:blip r:embed="rId5"/>
+                        <a:blip r:embed="rId4"/>
                         <a:stretch>
                           <a:fillRect/>
                         </a:stretch>
                       </p166:blipFill>
                       <p166:spPr xmlns:p166="http://schemas.microsoft.com/office/powerpoint/2016/6/main">
-                        <a:xfrm rot="3180000">
+                        <a:xfrm rot="3187800">
                           <a:off x="0" y="0"/>
-                          <a:ext cx="5184000" cy="4319205"/>
+                          <a:ext cx="5184000" cy="3671563"/>
                         </a:xfrm>
                         <a:prstGeom prst="rect">
                           <a:avLst/>
@@ -3588,11 +3109,11 @@
         <mc:Fallback>
           <p:pic>
             <p:nvPicPr>
-              <p:cNvPr id="15" name="Slide Zoom 14">
-                <a:hlinkClick r:id="rId4" action="ppaction://hlinksldjump"/>
+              <p:cNvPr id="7" name="Slide Zoom 6">
+                <a:hlinkClick r:id="rId3" action="ppaction://hlinksldjump"/>
                 <a:extLst>
                   <a:ext uri="{FF2B5EF4-FFF2-40B4-BE49-F238E27FC236}">
-                    <a16:creationId xmlns:a16="http://schemas.microsoft.com/office/drawing/2014/main" id="{FA9BA35C-31A3-EF4E-B159-18655325BB74}"/>
+                    <a16:creationId xmlns:a16="http://schemas.microsoft.com/office/drawing/2014/main" id="{70E2BE6A-C80D-1B7A-F591-4456276E64EF}"/>
                   </a:ext>
                 </a:extLst>
               </p:cNvPr>
@@ -3602,15 +3123,15 @@
               <p:nvPr/>
             </p:nvPicPr>
             <p:blipFill>
-              <a:blip r:embed="rId5"/>
+              <a:blip r:embed="rId4"/>
               <a:stretch>
                 <a:fillRect/>
               </a:stretch>
             </p:blipFill>
             <p:spPr>
-              <a:xfrm rot="3180000">
-                <a:off x="3715200" y="1170000"/>
-                <a:ext cx="5184000" cy="4319205"/>
+              <a:xfrm rot="3187800">
+                <a:off x="4009595" y="1022709"/>
+                <a:ext cx="5184000" cy="3671563"/>
               </a:xfrm>
               <a:prstGeom prst="rect">
                 <a:avLst/>
@@ -3622,7 +3143,7 @@
     </p:spTree>
     <p:extLst>
       <p:ext uri="{BB962C8B-B14F-4D97-AF65-F5344CB8AC3E}">
-        <p14:creationId xmlns:p14="http://schemas.microsoft.com/office/powerpoint/2010/main" val="1580736921"/>
+        <p14:creationId xmlns:p14="http://schemas.microsoft.com/office/powerpoint/2010/main" val="2380184264"/>
       </p:ext>
     </p:extLst>
   </p:cSld>
@@ -3893,301 +3414,6 @@
 </a:theme>
 </file>
 
-<file path=ppt/theme/theme2.xml><?xml version="1.0" encoding="utf-8"?>
-<a:theme xmlns:a="http://schemas.openxmlformats.org/drawingml/2006/main" name="Office Theme">
-  <a:themeElements>
-    <a:clrScheme name="Office">
-      <a:dk1>
-        <a:sysClr val="windowText" lastClr="000000"/>
-      </a:dk1>
-      <a:lt1>
-        <a:sysClr val="window" lastClr="FFFFFF"/>
-      </a:lt1>
-      <a:dk2>
-        <a:srgbClr val="44546A"/>
-      </a:dk2>
-      <a:lt2>
-        <a:srgbClr val="E7E6E6"/>
-      </a:lt2>
-      <a:accent1>
-        <a:srgbClr val="4472C4"/>
-      </a:accent1>
-      <a:accent2>
-        <a:srgbClr val="ED7D31"/>
-      </a:accent2>
-      <a:accent3>
-        <a:srgbClr val="A5A5A5"/>
-      </a:accent3>
-      <a:accent4>
-        <a:srgbClr val="FFC000"/>
-      </a:accent4>
-      <a:accent5>
-        <a:srgbClr val="5B9BD5"/>
-      </a:accent5>
-      <a:accent6>
-        <a:srgbClr val="70AD47"/>
-      </a:accent6>
-      <a:hlink>
-        <a:srgbClr val="0563C1"/>
-      </a:hlink>
-      <a:folHlink>
-        <a:srgbClr val="954F72"/>
-      </a:folHlink>
-    </a:clrScheme>
-    <a:fontScheme name="Office">
-      <a:majorFont>
-        <a:latin typeface="Calibri Light" panose="020F0302020204030204"/>
-        <a:ea typeface=""/>
-        <a:cs typeface=""/>
-        <a:font script="Jpan" typeface="游ゴシック Light"/>
-        <a:font script="Hang" typeface="맑은 고딕"/>
-        <a:font script="Hans" typeface="等线 Light"/>
-        <a:font script="Hant" typeface="新細明體"/>
-        <a:font script="Arab" typeface="Times New Roman"/>
-        <a:font script="Hebr" typeface="Times New Roman"/>
-        <a:font script="Thai" typeface="Angsana New"/>
-        <a:font script="Ethi" typeface="Nyala"/>
-        <a:font script="Beng" typeface="Vrinda"/>
-        <a:font script="Gujr" typeface="Shruti"/>
-        <a:font script="Khmr" typeface="MoolBoran"/>
-        <a:font script="Knda" typeface="Tunga"/>
-        <a:font script="Guru" typeface="Raavi"/>
-        <a:font script="Cans" typeface="Euphemia"/>
-        <a:font script="Cher" typeface="Plantagenet Cherokee"/>
-        <a:font script="Yiii" typeface="Microsoft Yi Baiti"/>
-        <a:font script="Tibt" typeface="Microsoft Himalaya"/>
-        <a:font script="Thaa" typeface="MV Boli"/>
-        <a:font script="Deva" typeface="Mangal"/>
-        <a:font script="Telu" typeface="Gautami"/>
-        <a:font script="Taml" typeface="Latha"/>
-        <a:font script="Syrc" typeface="Estrangelo Edessa"/>
-        <a:font script="Orya" typeface="Kalinga"/>
-        <a:font script="Mlym" typeface="Kartika"/>
-        <a:font script="Laoo" typeface="DokChampa"/>
-        <a:font script="Sinh" typeface="Iskoola Pota"/>
-        <a:font script="Mong" typeface="Mongolian Baiti"/>
-        <a:font script="Viet" typeface="Times New Roman"/>
-        <a:font script="Uigh" typeface="Microsoft Uighur"/>
-        <a:font script="Geor" typeface="Sylfaen"/>
-        <a:font script="Armn" typeface="Arial"/>
-        <a:font script="Bugi" typeface="Leelawadee UI"/>
-        <a:font script="Bopo" typeface="Microsoft JhengHei"/>
-        <a:font script="Java" typeface="Javanese Text"/>
-        <a:font script="Lisu" typeface="Segoe UI"/>
-        <a:font script="Mymr" typeface="Myanmar Text"/>
-        <a:font script="Nkoo" typeface="Ebrima"/>
-        <a:font script="Olck" typeface="Nirmala UI"/>
-        <a:font script="Osma" typeface="Ebrima"/>
-        <a:font script="Phag" typeface="Phagspa"/>
-        <a:font script="Syrn" typeface="Estrangelo Edessa"/>
-        <a:font script="Syrj" typeface="Estrangelo Edessa"/>
-        <a:font script="Syre" typeface="Estrangelo Edessa"/>
-        <a:font script="Sora" typeface="Nirmala UI"/>
-        <a:font script="Tale" typeface="Microsoft Tai Le"/>
-        <a:font script="Talu" typeface="Microsoft New Tai Lue"/>
-        <a:font script="Tfng" typeface="Ebrima"/>
-      </a:majorFont>
-      <a:minorFont>
-        <a:latin typeface="Calibri" panose="020F0502020204030204"/>
-        <a:ea typeface=""/>
-        <a:cs typeface=""/>
-        <a:font script="Jpan" typeface="游ゴシック"/>
-        <a:font script="Hang" typeface="맑은 고딕"/>
-        <a:font script="Hans" typeface="等线"/>
-        <a:font script="Hant" typeface="新細明體"/>
-        <a:font script="Arab" typeface="Arial"/>
-        <a:font script="Hebr" typeface="Arial"/>
-        <a:font script="Thai" typeface="Cordia New"/>
-        <a:font script="Ethi" typeface="Nyala"/>
-        <a:font script="Beng" typeface="Vrinda"/>
-        <a:font script="Gujr" typeface="Shruti"/>
-        <a:font script="Khmr" typeface="DaunPenh"/>
-        <a:font script="Knda" typeface="Tunga"/>
-        <a:font script="Guru" typeface="Raavi"/>
-        <a:font script="Cans" typeface="Euphemia"/>
-        <a:font script="Cher" typeface="Plantagenet Cherokee"/>
-        <a:font script="Yiii" typeface="Microsoft Yi Baiti"/>
-        <a:font script="Tibt" typeface="Microsoft Himalaya"/>
-        <a:font script="Thaa" typeface="MV Boli"/>
-        <a:font script="Deva" typeface="Mangal"/>
-        <a:font script="Telu" typeface="Gautami"/>
-        <a:font script="Taml" typeface="Latha"/>
-        <a:font script="Syrc" typeface="Estrangelo Edessa"/>
-        <a:font script="Orya" typeface="Kalinga"/>
-        <a:font script="Mlym" typeface="Kartika"/>
-        <a:font script="Laoo" typeface="DokChampa"/>
-        <a:font script="Sinh" typeface="Iskoola Pota"/>
-        <a:font script="Mong" typeface="Mongolian Baiti"/>
-        <a:font script="Viet" typeface="Arial"/>
-        <a:font script="Uigh" typeface="Microsoft Uighur"/>
-        <a:font script="Geor" typeface="Sylfaen"/>
-        <a:font script="Armn" typeface="Arial"/>
-        <a:font script="Bugi" typeface="Leelawadee UI"/>
-        <a:font script="Bopo" typeface="Microsoft JhengHei"/>
-        <a:font script="Java" typeface="Javanese Text"/>
-        <a:font script="Lisu" typeface="Segoe UI"/>
-        <a:font script="Mymr" typeface="Myanmar Text"/>
-        <a:font script="Nkoo" typeface="Ebrima"/>
-        <a:font script="Olck" typeface="Nirmala UI"/>
-        <a:font script="Osma" typeface="Ebrima"/>
-        <a:font script="Phag" typeface="Phagspa"/>
-        <a:font script="Syrn" typeface="Estrangelo Edessa"/>
-        <a:font script="Syrj" typeface="Estrangelo Edessa"/>
-        <a:font script="Syre" typeface="Estrangelo Edessa"/>
-        <a:font script="Sora" typeface="Nirmala UI"/>
-        <a:font script="Tale" typeface="Microsoft Tai Le"/>
-        <a:font script="Talu" typeface="Microsoft New Tai Lue"/>
-        <a:font script="Tfng" typeface="Ebrima"/>
-      </a:minorFont>
-    </a:fontScheme>
-    <a:fmtScheme name="Office">
-      <a:fillStyleLst>
-        <a:solidFill>
-          <a:schemeClr val="phClr"/>
-        </a:solidFill>
-        <a:gradFill rotWithShape="1">
-          <a:gsLst>
-            <a:gs pos="0">
-              <a:schemeClr val="phClr">
-                <a:lumMod val="110000"/>
-                <a:satMod val="105000"/>
-                <a:tint val="67000"/>
-              </a:schemeClr>
-            </a:gs>
-            <a:gs pos="50000">
-              <a:schemeClr val="phClr">
-                <a:lumMod val="105000"/>
-                <a:satMod val="103000"/>
-                <a:tint val="73000"/>
-              </a:schemeClr>
-            </a:gs>
-            <a:gs pos="100000">
-              <a:schemeClr val="phClr">
-                <a:lumMod val="105000"/>
-                <a:satMod val="109000"/>
-                <a:tint val="81000"/>
-              </a:schemeClr>
-            </a:gs>
-          </a:gsLst>
-          <a:lin ang="5400000" scaled="0"/>
-        </a:gradFill>
-        <a:gradFill rotWithShape="1">
-          <a:gsLst>
-            <a:gs pos="0">
-              <a:schemeClr val="phClr">
-                <a:satMod val="103000"/>
-                <a:lumMod val="102000"/>
-                <a:tint val="94000"/>
-              </a:schemeClr>
-            </a:gs>
-            <a:gs pos="50000">
-              <a:schemeClr val="phClr">
-                <a:satMod val="110000"/>
-                <a:lumMod val="100000"/>
-                <a:shade val="100000"/>
-              </a:schemeClr>
-            </a:gs>
-            <a:gs pos="100000">
-              <a:schemeClr val="phClr">
-                <a:lumMod val="99000"/>
-                <a:satMod val="120000"/>
-                <a:shade val="78000"/>
-              </a:schemeClr>
-            </a:gs>
-          </a:gsLst>
-          <a:lin ang="5400000" scaled="0"/>
-        </a:gradFill>
-      </a:fillStyleLst>
-      <a:lnStyleLst>
-        <a:ln w="6350" cap="flat" cmpd="sng" algn="ctr">
-          <a:solidFill>
-            <a:schemeClr val="phClr"/>
-          </a:solidFill>
-          <a:prstDash val="solid"/>
-          <a:miter lim="800000"/>
-        </a:ln>
-        <a:ln w="12700" cap="flat" cmpd="sng" algn="ctr">
-          <a:solidFill>
-            <a:schemeClr val="phClr"/>
-          </a:solidFill>
-          <a:prstDash val="solid"/>
-          <a:miter lim="800000"/>
-        </a:ln>
-        <a:ln w="19050" cap="flat" cmpd="sng" algn="ctr">
-          <a:solidFill>
-            <a:schemeClr val="phClr"/>
-          </a:solidFill>
-          <a:prstDash val="solid"/>
-          <a:miter lim="800000"/>
-        </a:ln>
-      </a:lnStyleLst>
-      <a:effectStyleLst>
-        <a:effectStyle>
-          <a:effectLst/>
-        </a:effectStyle>
-        <a:effectStyle>
-          <a:effectLst/>
-        </a:effectStyle>
-        <a:effectStyle>
-          <a:effectLst>
-            <a:outerShdw blurRad="57150" dist="19050" dir="5400000" algn="ctr" rotWithShape="0">
-              <a:srgbClr val="000000">
-                <a:alpha val="63000"/>
-              </a:srgbClr>
-            </a:outerShdw>
-          </a:effectLst>
-        </a:effectStyle>
-      </a:effectStyleLst>
-      <a:bgFillStyleLst>
-        <a:solidFill>
-          <a:schemeClr val="phClr"/>
-        </a:solidFill>
-        <a:solidFill>
-          <a:schemeClr val="phClr">
-            <a:tint val="95000"/>
-            <a:satMod val="170000"/>
-          </a:schemeClr>
-        </a:solidFill>
-        <a:gradFill rotWithShape="1">
-          <a:gsLst>
-            <a:gs pos="0">
-              <a:schemeClr val="phClr">
-                <a:tint val="93000"/>
-                <a:satMod val="150000"/>
-                <a:shade val="98000"/>
-                <a:lumMod val="102000"/>
-              </a:schemeClr>
-            </a:gs>
-            <a:gs pos="50000">
-              <a:schemeClr val="phClr">
-                <a:tint val="98000"/>
-                <a:satMod val="130000"/>
-                <a:shade val="90000"/>
-                <a:lumMod val="103000"/>
-              </a:schemeClr>
-            </a:gs>
-            <a:gs pos="100000">
-              <a:schemeClr val="phClr">
-                <a:shade val="63000"/>
-                <a:satMod val="120000"/>
-              </a:schemeClr>
-            </a:gs>
-          </a:gsLst>
-          <a:lin ang="5400000" scaled="0"/>
-        </a:gradFill>
-      </a:bgFillStyleLst>
-    </a:fmtScheme>
-  </a:themeElements>
-  <a:objectDefaults/>
-  <a:extraClrSchemeLst/>
-  <a:extLst>
-    <a:ext uri="{05A4C25C-085E-4340-85A3-A5531E510DB2}">
-      <thm15:themeFamily xmlns:thm15="http://schemas.microsoft.com/office/thememl/2012/main" name="Office Theme" id="{62F939B6-93AF-4DB8-9C6B-D6C7DFDC589F}" vid="{4A3C46E8-61CC-4603-A589-7422A47A8E4A}"/>
-    </a:ext>
-  </a:extLst>
-</a:theme>
-</file>
-
 <file path=docMetadata/LabelInfo.xml><?xml version="1.0" encoding="utf-8"?>
 <clbl:labelList xmlns:clbl="http://schemas.microsoft.com/office/2020/mipLabelMetadata">
   <clbl:label id="{f42aa342-8706-4288-bd11-ebb85995028c}" enabled="1" method="Standard" siteId="{72f988bf-86f1-41af-91ab-2d7cd011db47}" contentBits="0" removed="0"/>

</xml_diff>